<commit_message>
Tested the whole PPU, correct.
</commit_message>
<xml_diff>
--- a/ppt/0520.pptx
+++ b/ppt/0520.pptx
@@ -5,7 +5,7 @@
     <p:sldMasterId id="2147483660" r:id="rId1"/>
   </p:sldMasterIdLst>
   <p:notesMasterIdLst>
-    <p:notesMasterId r:id="rId12"/>
+    <p:notesMasterId r:id="rId13"/>
   </p:notesMasterIdLst>
   <p:sldIdLst>
     <p:sldId id="256" r:id="rId2"/>
@@ -18,6 +18,7 @@
     <p:sldId id="328" r:id="rId9"/>
     <p:sldId id="330" r:id="rId10"/>
     <p:sldId id="331" r:id="rId11"/>
+    <p:sldId id="332" r:id="rId12"/>
   </p:sldIdLst>
   <p:sldSz cx="12192000" cy="6858000"/>
   <p:notesSz cx="6858000" cy="9144000"/>
@@ -206,7 +207,7 @@
           <a:p>
             <a:fld id="{FEE5F619-DF5E-416B-B866-5F6697AABCEE}" type="datetimeFigureOut">
               <a:rPr lang="zh-TW" altLang="en-US" smtClean="0"/>
-              <a:t>2025/5/17</a:t>
+              <a:t>2025/5/19</a:t>
             </a:fld>
             <a:endParaRPr lang="zh-TW" altLang="en-US"/>
           </a:p>
@@ -642,7 +643,7 @@
           <a:p>
             <a:fld id="{B5CC9422-2511-4DEB-8886-B5AD4CD25B7D}" type="datetime1">
               <a:rPr lang="zh-TW" altLang="en-US" smtClean="0"/>
-              <a:t>2025/5/17</a:t>
+              <a:t>2025/5/19</a:t>
             </a:fld>
             <a:endParaRPr lang="zh-TW" altLang="en-US"/>
           </a:p>
@@ -972,7 +973,7 @@
           <a:p>
             <a:fld id="{B6DDFE32-2043-4B95-8CEA-949D1D532E89}" type="datetime1">
               <a:rPr lang="zh-TW" altLang="en-US" smtClean="0"/>
-              <a:t>2025/5/17</a:t>
+              <a:t>2025/5/19</a:t>
             </a:fld>
             <a:endParaRPr lang="zh-TW" altLang="en-US"/>
           </a:p>
@@ -1152,7 +1153,7 @@
           <a:p>
             <a:fld id="{207C0BCD-8E35-4E36-BA70-DF8CCEC4F900}" type="datetime1">
               <a:rPr lang="zh-TW" altLang="en-US" smtClean="0"/>
-              <a:t>2025/5/17</a:t>
+              <a:t>2025/5/19</a:t>
             </a:fld>
             <a:endParaRPr lang="zh-TW" altLang="en-US"/>
           </a:p>
@@ -1361,7 +1362,7 @@
           <a:p>
             <a:fld id="{D12744AA-2124-42E6-AA52-9077A6A76493}" type="datetime1">
               <a:rPr lang="zh-TW" altLang="en-US" smtClean="0"/>
-              <a:t>2025/5/17</a:t>
+              <a:t>2025/5/19</a:t>
             </a:fld>
             <a:endParaRPr lang="zh-TW" altLang="en-US"/>
           </a:p>
@@ -1638,7 +1639,7 @@
           <a:p>
             <a:fld id="{1E2A031D-4FFA-4B7E-B90B-3B0E99D95905}" type="datetime1">
               <a:rPr lang="zh-TW" altLang="en-US" smtClean="0"/>
-              <a:t>2025/5/17</a:t>
+              <a:t>2025/5/19</a:t>
             </a:fld>
             <a:endParaRPr lang="zh-TW" altLang="en-US"/>
           </a:p>
@@ -2032,7 +2033,7 @@
           <a:p>
             <a:fld id="{D963E789-9038-455D-87FB-B3612E9AC9A3}" type="datetime1">
               <a:rPr lang="zh-TW" altLang="en-US" smtClean="0"/>
-              <a:t>2025/5/17</a:t>
+              <a:t>2025/5/19</a:t>
             </a:fld>
             <a:endParaRPr lang="zh-TW" altLang="en-US"/>
           </a:p>
@@ -2509,7 +2510,7 @@
           <a:p>
             <a:fld id="{1AE525C3-42CF-4363-9956-46937FDA7220}" type="datetime1">
               <a:rPr lang="zh-TW" altLang="en-US" smtClean="0"/>
-              <a:t>2025/5/17</a:t>
+              <a:t>2025/5/19</a:t>
             </a:fld>
             <a:endParaRPr lang="zh-TW" altLang="en-US"/>
           </a:p>
@@ -2627,7 +2628,7 @@
           <a:p>
             <a:fld id="{4675F6D4-C983-4750-ACFD-FFD733A8AEBA}" type="datetime1">
               <a:rPr lang="zh-TW" altLang="en-US" smtClean="0"/>
-              <a:t>2025/5/17</a:t>
+              <a:t>2025/5/19</a:t>
             </a:fld>
             <a:endParaRPr lang="zh-TW" altLang="en-US"/>
           </a:p>
@@ -2722,7 +2723,7 @@
           <a:p>
             <a:fld id="{956BF6A0-178A-49B5-817C-3A928D943E2A}" type="datetime1">
               <a:rPr lang="zh-TW" altLang="en-US" smtClean="0"/>
-              <a:t>2025/5/17</a:t>
+              <a:t>2025/5/19</a:t>
             </a:fld>
             <a:endParaRPr lang="zh-TW" altLang="en-US"/>
           </a:p>
@@ -3068,7 +3069,7 @@
           <a:p>
             <a:fld id="{FFA7AC8A-5481-4A69-A182-F9F960B32A4D}" type="datetime1">
               <a:rPr lang="zh-TW" altLang="en-US" smtClean="0"/>
-              <a:t>2025/5/17</a:t>
+              <a:t>2025/5/19</a:t>
             </a:fld>
             <a:endParaRPr lang="zh-TW" altLang="en-US"/>
           </a:p>
@@ -3456,7 +3457,7 @@
           <a:p>
             <a:fld id="{FFD0E206-1C27-4E41-AC82-7A0AA2282A21}" type="datetime1">
               <a:rPr lang="zh-TW" altLang="en-US" smtClean="0"/>
-              <a:t>2025/5/17</a:t>
+              <a:t>2025/5/19</a:t>
             </a:fld>
             <a:endParaRPr lang="zh-TW" altLang="en-US"/>
           </a:p>
@@ -3738,7 +3739,7 @@
             <a:fld id="{B73B85AF-FB41-4DE2-B200-20D62EB52EF6}" type="datetime1">
               <a:rPr lang="zh-TW" altLang="en-US" smtClean="0"/>
               <a:pPr/>
-              <a:t>2025/5/17</a:t>
+              <a:t>2025/5/19</a:t>
             </a:fld>
             <a:endParaRPr lang="zh-TW" altLang="en-US"/>
           </a:p>
@@ -4341,7 +4342,7 @@
                 <a:latin typeface="Times New Roman" panose="02020603050405020304" pitchFamily="18" charset="0"/>
                 <a:cs typeface="Times New Roman" panose="02020603050405020304" pitchFamily="18" charset="0"/>
               </a:rPr>
-              <a:t>2025/5/17</a:t>
+              <a:t>2025/5/19</a:t>
             </a:fld>
             <a:endParaRPr lang="zh-TW" altLang="en-US" sz="1600" dirty="0">
               <a:latin typeface="Times New Roman" panose="02020603050405020304" pitchFamily="18" charset="0"/>
@@ -4768,7 +4769,7 @@
           <a:p>
             <a:fld id="{D12744AA-2124-42E6-AA52-9077A6A76493}" type="datetime1">
               <a:rPr lang="zh-TW" altLang="en-US" smtClean="0"/>
-              <a:t>2025/5/18</a:t>
+              <a:t>2025/5/19</a:t>
             </a:fld>
             <a:endParaRPr lang="zh-TW" altLang="en-US"/>
           </a:p>
@@ -5358,6 +5359,454 @@
 </p:sld>
 </file>
 
+<file path=ppt/slides/slide11.xml><?xml version="1.0" encoding="utf-8"?>
+<p:sld xmlns:a="http://schemas.openxmlformats.org/drawingml/2006/main" xmlns:r="http://schemas.openxmlformats.org/officeDocument/2006/relationships" xmlns:p="http://schemas.openxmlformats.org/presentationml/2006/main">
+  <p:cSld>
+    <p:spTree>
+      <p:nvGrpSpPr>
+        <p:cNvPr id="1" name=""/>
+        <p:cNvGrpSpPr/>
+        <p:nvPr/>
+      </p:nvGrpSpPr>
+      <p:grpSpPr>
+        <a:xfrm>
+          <a:off x="0" y="0"/>
+          <a:ext cx="0" cy="0"/>
+          <a:chOff x="0" y="0"/>
+          <a:chExt cx="0" cy="0"/>
+        </a:xfrm>
+      </p:grpSpPr>
+      <p:sp>
+        <p:nvSpPr>
+          <p:cNvPr id="2" name="標題 1">
+            <a:extLst>
+              <a:ext uri="{FF2B5EF4-FFF2-40B4-BE49-F238E27FC236}">
+                <a16:creationId xmlns:a16="http://schemas.microsoft.com/office/drawing/2014/main" id="{2A030E4E-6B6F-428D-88BC-5A6D82AE1AAF}"/>
+              </a:ext>
+            </a:extLst>
+          </p:cNvPr>
+          <p:cNvSpPr>
+            <a:spLocks noGrp="1"/>
+          </p:cNvSpPr>
+          <p:nvPr>
+            <p:ph type="title"/>
+          </p:nvPr>
+        </p:nvSpPr>
+        <p:spPr/>
+        <p:txBody>
+          <a:bodyPr/>
+          <a:lstStyle/>
+          <a:p>
+            <a:r>
+              <a:rPr lang="en-US" altLang="zh-TW" dirty="0"/>
+              <a:t>Testing Overall Correctness</a:t>
+            </a:r>
+            <a:r>
+              <a:rPr lang="zh-TW" altLang="en-US" dirty="0"/>
+              <a:t> </a:t>
+            </a:r>
+            <a:r>
+              <a:rPr lang="en-US" altLang="zh-TW" dirty="0"/>
+              <a:t>of PPU</a:t>
+            </a:r>
+            <a:endParaRPr lang="zh-TW" altLang="en-US" dirty="0"/>
+          </a:p>
+        </p:txBody>
+      </p:sp>
+      <p:sp>
+        <p:nvSpPr>
+          <p:cNvPr id="3" name="內容版面配置區 2">
+            <a:extLst>
+              <a:ext uri="{FF2B5EF4-FFF2-40B4-BE49-F238E27FC236}">
+                <a16:creationId xmlns:a16="http://schemas.microsoft.com/office/drawing/2014/main" id="{7F4C614D-E7FE-419C-8F98-21873BA85352}"/>
+              </a:ext>
+            </a:extLst>
+          </p:cNvPr>
+          <p:cNvSpPr>
+            <a:spLocks noGrp="1"/>
+          </p:cNvSpPr>
+          <p:nvPr>
+            <p:ph idx="1"/>
+          </p:nvPr>
+        </p:nvSpPr>
+        <p:spPr>
+          <a:xfrm>
+            <a:off x="1371599" y="1620141"/>
+            <a:ext cx="10534011" cy="730293"/>
+          </a:xfrm>
+        </p:spPr>
+        <p:txBody>
+          <a:bodyPr>
+            <a:normAutofit/>
+          </a:bodyPr>
+          <a:lstStyle/>
+          <a:p>
+            <a:r>
+              <a:rPr lang="en-US" altLang="zh-TW" dirty="0"/>
+              <a:t>The test case is (120, 120, 121, 121, … , 127, 127), the theoretical output is </a:t>
+            </a:r>
+          </a:p>
+          <a:p>
+            <a:endParaRPr lang="zh-TW" altLang="en-US" dirty="0"/>
+          </a:p>
+        </p:txBody>
+      </p:sp>
+      <p:sp>
+        <p:nvSpPr>
+          <p:cNvPr id="4" name="日期版面配置區 3">
+            <a:extLst>
+              <a:ext uri="{FF2B5EF4-FFF2-40B4-BE49-F238E27FC236}">
+                <a16:creationId xmlns:a16="http://schemas.microsoft.com/office/drawing/2014/main" id="{159AF3C7-1F38-4208-B828-B2261917AF9D}"/>
+              </a:ext>
+            </a:extLst>
+          </p:cNvPr>
+          <p:cNvSpPr>
+            <a:spLocks noGrp="1"/>
+          </p:cNvSpPr>
+          <p:nvPr>
+            <p:ph type="dt" sz="half" idx="10"/>
+          </p:nvPr>
+        </p:nvSpPr>
+        <p:spPr/>
+        <p:txBody>
+          <a:bodyPr/>
+          <a:lstStyle/>
+          <a:p>
+            <a:fld id="{D12744AA-2124-42E6-AA52-9077A6A76493}" type="datetime1">
+              <a:rPr lang="zh-TW" altLang="en-US" smtClean="0"/>
+              <a:t>2025/5/19</a:t>
+            </a:fld>
+            <a:endParaRPr lang="zh-TW" altLang="en-US"/>
+          </a:p>
+        </p:txBody>
+      </p:sp>
+      <p:sp>
+        <p:nvSpPr>
+          <p:cNvPr id="5" name="投影片編號版面配置區 4">
+            <a:extLst>
+              <a:ext uri="{FF2B5EF4-FFF2-40B4-BE49-F238E27FC236}">
+                <a16:creationId xmlns:a16="http://schemas.microsoft.com/office/drawing/2014/main" id="{650122B4-4ECD-4625-BAFC-6FB6E0AAF4D9}"/>
+              </a:ext>
+            </a:extLst>
+          </p:cNvPr>
+          <p:cNvSpPr>
+            <a:spLocks noGrp="1"/>
+          </p:cNvSpPr>
+          <p:nvPr>
+            <p:ph type="sldNum" sz="quarter" idx="12"/>
+          </p:nvPr>
+        </p:nvSpPr>
+        <p:spPr/>
+        <p:txBody>
+          <a:bodyPr/>
+          <a:lstStyle/>
+          <a:p>
+            <a:fld id="{13D67497-B2F6-4681-B86D-28F94DA14DA8}" type="slidenum">
+              <a:rPr lang="zh-TW" altLang="en-US" smtClean="0"/>
+              <a:t>11</a:t>
+            </a:fld>
+            <a:endParaRPr lang="zh-TW" altLang="en-US"/>
+          </a:p>
+        </p:txBody>
+      </p:sp>
+      <p:sp>
+        <p:nvSpPr>
+          <p:cNvPr id="15" name="內容版面配置區 2">
+            <a:extLst>
+              <a:ext uri="{FF2B5EF4-FFF2-40B4-BE49-F238E27FC236}">
+                <a16:creationId xmlns:a16="http://schemas.microsoft.com/office/drawing/2014/main" id="{BA214C04-2EFC-4059-95D0-F675C135009A}"/>
+              </a:ext>
+            </a:extLst>
+          </p:cNvPr>
+          <p:cNvSpPr txBox="1">
+            <a:spLocks/>
+          </p:cNvSpPr>
+          <p:nvPr/>
+        </p:nvSpPr>
+        <p:spPr>
+          <a:xfrm>
+            <a:off x="1371598" y="2554482"/>
+            <a:ext cx="10534011" cy="730293"/>
+          </a:xfrm>
+          <a:prstGeom prst="rect">
+            <a:avLst/>
+          </a:prstGeom>
+        </p:spPr>
+        <p:txBody>
+          <a:bodyPr vert="horz" lIns="91440" tIns="45720" rIns="91440" bIns="45720" rtlCol="0">
+            <a:normAutofit/>
+          </a:bodyPr>
+          <a:lstStyle>
+            <a:lvl1pPr marL="384048" indent="-384048" algn="l" defTabSz="914400" rtl="0" eaLnBrk="1" latinLnBrk="0" hangingPunct="1">
+              <a:lnSpc>
+                <a:spcPct val="150000"/>
+              </a:lnSpc>
+              <a:spcBef>
+                <a:spcPts val="1000"/>
+              </a:spcBef>
+              <a:spcAft>
+                <a:spcPts val="200"/>
+              </a:spcAft>
+              <a:buFont typeface="Franklin Gothic Book" panose="020B0503020102020204" pitchFamily="34" charset="0"/>
+              <a:buChar char="■"/>
+              <a:defRPr sz="2400" kern="1200" baseline="0">
+                <a:solidFill>
+                  <a:schemeClr val="tx2"/>
+                </a:solidFill>
+                <a:latin typeface="Times New Roman" panose="02020603050405020304" pitchFamily="18" charset="0"/>
+                <a:ea typeface="標楷體" panose="03000509000000000000" pitchFamily="65" charset="-120"/>
+                <a:cs typeface="Times New Roman" panose="02020603050405020304" pitchFamily="18" charset="0"/>
+              </a:defRPr>
+            </a:lvl1pPr>
+            <a:lvl2pPr marL="914400" indent="-384048" algn="l" defTabSz="914400" rtl="0" eaLnBrk="1" latinLnBrk="0" hangingPunct="1">
+              <a:lnSpc>
+                <a:spcPct val="150000"/>
+              </a:lnSpc>
+              <a:spcBef>
+                <a:spcPts val="500"/>
+              </a:spcBef>
+              <a:spcAft>
+                <a:spcPts val="200"/>
+              </a:spcAft>
+              <a:buFont typeface="Franklin Gothic Book" panose="020B0503020102020204" pitchFamily="34" charset="0"/>
+              <a:buChar char="–"/>
+              <a:defRPr sz="2400" i="1" kern="1200" baseline="0">
+                <a:solidFill>
+                  <a:schemeClr val="tx2"/>
+                </a:solidFill>
+                <a:latin typeface="Times New Roman" panose="02020603050405020304" pitchFamily="18" charset="0"/>
+                <a:ea typeface="標楷體" panose="03000509000000000000" pitchFamily="65" charset="-120"/>
+                <a:cs typeface="Times New Roman" panose="02020603050405020304" pitchFamily="18" charset="0"/>
+              </a:defRPr>
+            </a:lvl2pPr>
+            <a:lvl3pPr marL="1371600" indent="-384048" algn="l" defTabSz="914400" rtl="0" eaLnBrk="1" latinLnBrk="0" hangingPunct="1">
+              <a:lnSpc>
+                <a:spcPct val="150000"/>
+              </a:lnSpc>
+              <a:spcBef>
+                <a:spcPts val="500"/>
+              </a:spcBef>
+              <a:spcAft>
+                <a:spcPts val="200"/>
+              </a:spcAft>
+              <a:buFont typeface="Franklin Gothic Book" panose="020B0503020102020204" pitchFamily="34" charset="0"/>
+              <a:buChar char="■"/>
+              <a:defRPr sz="2000" kern="1200" baseline="0">
+                <a:solidFill>
+                  <a:schemeClr val="tx2"/>
+                </a:solidFill>
+                <a:latin typeface="Times New Roman" panose="02020603050405020304" pitchFamily="18" charset="0"/>
+                <a:ea typeface="標楷體" panose="03000509000000000000" pitchFamily="65" charset="-120"/>
+                <a:cs typeface="Times New Roman" panose="02020603050405020304" pitchFamily="18" charset="0"/>
+              </a:defRPr>
+            </a:lvl3pPr>
+            <a:lvl4pPr marL="1828800" indent="-384048" algn="l" defTabSz="914400" rtl="0" eaLnBrk="1" latinLnBrk="0" hangingPunct="1">
+              <a:lnSpc>
+                <a:spcPct val="150000"/>
+              </a:lnSpc>
+              <a:spcBef>
+                <a:spcPts val="500"/>
+              </a:spcBef>
+              <a:spcAft>
+                <a:spcPts val="200"/>
+              </a:spcAft>
+              <a:buFont typeface="Franklin Gothic Book" panose="020B0503020102020204" pitchFamily="34" charset="0"/>
+              <a:buChar char="–"/>
+              <a:defRPr sz="2000" i="1" kern="1200" baseline="0">
+                <a:solidFill>
+                  <a:schemeClr val="tx2"/>
+                </a:solidFill>
+                <a:latin typeface="Times New Roman" panose="02020603050405020304" pitchFamily="18" charset="0"/>
+                <a:ea typeface="標楷體" panose="03000509000000000000" pitchFamily="65" charset="-120"/>
+                <a:cs typeface="Times New Roman" panose="02020603050405020304" pitchFamily="18" charset="0"/>
+              </a:defRPr>
+            </a:lvl4pPr>
+            <a:lvl5pPr marL="2286000" indent="-384048" algn="l" defTabSz="914400" rtl="0" eaLnBrk="1" latinLnBrk="0" hangingPunct="1">
+              <a:lnSpc>
+                <a:spcPct val="150000"/>
+              </a:lnSpc>
+              <a:spcBef>
+                <a:spcPts val="500"/>
+              </a:spcBef>
+              <a:spcAft>
+                <a:spcPts val="200"/>
+              </a:spcAft>
+              <a:buFont typeface="Franklin Gothic Book" panose="020B0503020102020204" pitchFamily="34" charset="0"/>
+              <a:buChar char="■"/>
+              <a:defRPr sz="1800" kern="1200" baseline="0">
+                <a:solidFill>
+                  <a:schemeClr val="tx2"/>
+                </a:solidFill>
+                <a:latin typeface="Times New Roman" panose="02020603050405020304" pitchFamily="18" charset="0"/>
+                <a:ea typeface="標楷體" panose="03000509000000000000" pitchFamily="65" charset="-120"/>
+                <a:cs typeface="Times New Roman" panose="02020603050405020304" pitchFamily="18" charset="0"/>
+              </a:defRPr>
+            </a:lvl5pPr>
+            <a:lvl6pPr marL="2743200" indent="-384048" algn="l" defTabSz="914400" rtl="0" eaLnBrk="1" latinLnBrk="0" hangingPunct="1">
+              <a:lnSpc>
+                <a:spcPct val="94000"/>
+              </a:lnSpc>
+              <a:spcBef>
+                <a:spcPts val="500"/>
+              </a:spcBef>
+              <a:spcAft>
+                <a:spcPts val="200"/>
+              </a:spcAft>
+              <a:buFont typeface="Franklin Gothic Book" panose="020B0503020102020204" pitchFamily="34" charset="0"/>
+              <a:buChar char="–"/>
+              <a:defRPr sz="1600" i="1" kern="1200" baseline="0">
+                <a:solidFill>
+                  <a:schemeClr val="tx2"/>
+                </a:solidFill>
+                <a:latin typeface="+mn-lt"/>
+                <a:ea typeface="+mn-ea"/>
+                <a:cs typeface="+mn-cs"/>
+              </a:defRPr>
+            </a:lvl6pPr>
+            <a:lvl7pPr marL="3200400" indent="-384048" algn="l" defTabSz="914400" rtl="0" eaLnBrk="1" latinLnBrk="0" hangingPunct="1">
+              <a:lnSpc>
+                <a:spcPct val="94000"/>
+              </a:lnSpc>
+              <a:spcBef>
+                <a:spcPts val="500"/>
+              </a:spcBef>
+              <a:spcAft>
+                <a:spcPts val="200"/>
+              </a:spcAft>
+              <a:buFont typeface="Franklin Gothic Book" panose="020B0503020102020204" pitchFamily="34" charset="0"/>
+              <a:buChar char="■"/>
+              <a:defRPr sz="1400" kern="1200" baseline="0">
+                <a:solidFill>
+                  <a:schemeClr val="tx2"/>
+                </a:solidFill>
+                <a:latin typeface="+mn-lt"/>
+                <a:ea typeface="+mn-ea"/>
+                <a:cs typeface="+mn-cs"/>
+              </a:defRPr>
+            </a:lvl7pPr>
+            <a:lvl8pPr marL="3657600" indent="-384048" algn="l" defTabSz="914400" rtl="0" eaLnBrk="1" latinLnBrk="0" hangingPunct="1">
+              <a:lnSpc>
+                <a:spcPct val="94000"/>
+              </a:lnSpc>
+              <a:spcBef>
+                <a:spcPts val="500"/>
+              </a:spcBef>
+              <a:spcAft>
+                <a:spcPts val="200"/>
+              </a:spcAft>
+              <a:buFont typeface="Franklin Gothic Book" panose="020B0503020102020204" pitchFamily="34" charset="0"/>
+              <a:buChar char="–"/>
+              <a:defRPr sz="1400" i="1" kern="1200" baseline="0">
+                <a:solidFill>
+                  <a:schemeClr val="tx2"/>
+                </a:solidFill>
+                <a:latin typeface="+mn-lt"/>
+                <a:ea typeface="+mn-ea"/>
+                <a:cs typeface="+mn-cs"/>
+              </a:defRPr>
+            </a:lvl8pPr>
+            <a:lvl9pPr marL="4114800" indent="-384048" algn="l" defTabSz="914400" rtl="0" eaLnBrk="1" latinLnBrk="0" hangingPunct="1">
+              <a:lnSpc>
+                <a:spcPct val="94000"/>
+              </a:lnSpc>
+              <a:spcBef>
+                <a:spcPts val="500"/>
+              </a:spcBef>
+              <a:spcAft>
+                <a:spcPts val="200"/>
+              </a:spcAft>
+              <a:buFont typeface="Franklin Gothic Book" panose="020B0503020102020204" pitchFamily="34" charset="0"/>
+              <a:buChar char="■"/>
+              <a:defRPr sz="1400" kern="1200" baseline="0">
+                <a:solidFill>
+                  <a:schemeClr val="tx2"/>
+                </a:solidFill>
+                <a:latin typeface="+mn-lt"/>
+                <a:ea typeface="+mn-ea"/>
+                <a:cs typeface="+mn-cs"/>
+              </a:defRPr>
+            </a:lvl9pPr>
+          </a:lstStyle>
+          <a:p>
+            <a:r>
+              <a:rPr lang="en-US" altLang="zh-TW" dirty="0"/>
+              <a:t>The Verilog code output is</a:t>
+            </a:r>
+            <a:endParaRPr lang="zh-TW" altLang="en-US" dirty="0"/>
+          </a:p>
+        </p:txBody>
+      </p:sp>
+      <p:pic>
+        <p:nvPicPr>
+          <p:cNvPr id="7" name="圖片 6">
+            <a:extLst>
+              <a:ext uri="{FF2B5EF4-FFF2-40B4-BE49-F238E27FC236}">
+                <a16:creationId xmlns:a16="http://schemas.microsoft.com/office/drawing/2014/main" id="{55A730AA-AC65-48C5-A3B8-BD1C3D04973C}"/>
+              </a:ext>
+            </a:extLst>
+          </p:cNvPr>
+          <p:cNvPicPr>
+            <a:picLocks noChangeAspect="1"/>
+          </p:cNvPicPr>
+          <p:nvPr/>
+        </p:nvPicPr>
+        <p:blipFill rotWithShape="1">
+          <a:blip r:embed="rId2"/>
+          <a:srcRect b="50000"/>
+          <a:stretch/>
+        </p:blipFill>
+        <p:spPr>
+          <a:xfrm>
+            <a:off x="1715265" y="3415159"/>
+            <a:ext cx="3478199" cy="2757041"/>
+          </a:xfrm>
+          <a:prstGeom prst="rect">
+            <a:avLst/>
+          </a:prstGeom>
+        </p:spPr>
+      </p:pic>
+      <p:pic>
+        <p:nvPicPr>
+          <p:cNvPr id="9" name="圖片 8">
+            <a:extLst>
+              <a:ext uri="{FF2B5EF4-FFF2-40B4-BE49-F238E27FC236}">
+                <a16:creationId xmlns:a16="http://schemas.microsoft.com/office/drawing/2014/main" id="{9647C1A6-3D1F-4306-BA90-6C523F97406E}"/>
+              </a:ext>
+            </a:extLst>
+          </p:cNvPr>
+          <p:cNvPicPr>
+            <a:picLocks noChangeAspect="1"/>
+          </p:cNvPicPr>
+          <p:nvPr/>
+        </p:nvPicPr>
+        <p:blipFill rotWithShape="1">
+          <a:blip r:embed="rId2"/>
+          <a:srcRect t="50000"/>
+          <a:stretch/>
+        </p:blipFill>
+        <p:spPr>
+          <a:xfrm>
+            <a:off x="5553183" y="3415159"/>
+            <a:ext cx="3478198" cy="2757041"/>
+          </a:xfrm>
+          <a:prstGeom prst="rect">
+            <a:avLst/>
+          </a:prstGeom>
+        </p:spPr>
+      </p:pic>
+    </p:spTree>
+    <p:extLst>
+      <p:ext uri="{BB962C8B-B14F-4D97-AF65-F5344CB8AC3E}">
+        <p14:creationId xmlns:p14="http://schemas.microsoft.com/office/powerpoint/2010/main" val="2480734476"/>
+      </p:ext>
+    </p:extLst>
+  </p:cSld>
+  <p:clrMapOvr>
+    <a:masterClrMapping/>
+  </p:clrMapOvr>
+</p:sld>
+</file>
+
 <file path=ppt/slides/slide2.xml><?xml version="1.0" encoding="utf-8"?>
 <p:sld xmlns:a="http://schemas.openxmlformats.org/drawingml/2006/main" xmlns:r="http://schemas.openxmlformats.org/officeDocument/2006/relationships" xmlns:p="http://schemas.openxmlformats.org/presentationml/2006/main">
   <p:cSld>
@@ -5462,7 +5911,7 @@
           <a:p>
             <a:fld id="{D12744AA-2124-42E6-AA52-9077A6A76493}" type="datetime1">
               <a:rPr lang="zh-TW" altLang="en-US" smtClean="0"/>
-              <a:t>2025/5/17</a:t>
+              <a:t>2025/5/19</a:t>
             </a:fld>
             <a:endParaRPr lang="zh-TW" altLang="en-US"/>
           </a:p>
@@ -5696,7 +6145,7 @@
           <a:p>
             <a:fld id="{D12744AA-2124-42E6-AA52-9077A6A76493}" type="datetime1">
               <a:rPr lang="zh-TW" altLang="en-US" smtClean="0"/>
-              <a:t>2025/5/17</a:t>
+              <a:t>2025/5/19</a:t>
             </a:fld>
             <a:endParaRPr lang="zh-TW" altLang="en-US"/>
           </a:p>
@@ -5790,8 +6239,8 @@
           </a:p>
         </p:txBody>
       </p:sp>
-      <mc:AlternateContent xmlns:mc="http://schemas.openxmlformats.org/markup-compatibility/2006">
-        <mc:Choice xmlns:a14="http://schemas.microsoft.com/office/drawing/2010/main" Requires="a14">
+      <mc:AlternateContent xmlns:mc="http://schemas.openxmlformats.org/markup-compatibility/2006" xmlns:a14="http://schemas.microsoft.com/office/drawing/2010/main">
+        <mc:Choice Requires="a14">
           <p:sp>
             <p:nvSpPr>
               <p:cNvPr id="3" name="內容版面配置區 2">
@@ -6056,7 +6505,7 @@
             </p:txBody>
           </p:sp>
         </mc:Choice>
-        <mc:Fallback>
+        <mc:Fallback xmlns="">
           <p:sp>
             <p:nvSpPr>
               <p:cNvPr id="3" name="內容版面配置區 2">
@@ -6123,7 +6572,7 @@
           <a:p>
             <a:fld id="{D12744AA-2124-42E6-AA52-9077A6A76493}" type="datetime1">
               <a:rPr lang="zh-TW" altLang="en-US" smtClean="0"/>
-              <a:t>2025/5/17</a:t>
+              <a:t>2025/5/19</a:t>
             </a:fld>
             <a:endParaRPr lang="zh-TW" altLang="en-US"/>
           </a:p>
@@ -6669,7 +7118,7 @@
           <a:p>
             <a:fld id="{D12744AA-2124-42E6-AA52-9077A6A76493}" type="datetime1">
               <a:rPr lang="zh-TW" altLang="en-US" smtClean="0"/>
-              <a:t>2025/5/17</a:t>
+              <a:t>2025/5/19</a:t>
             </a:fld>
             <a:endParaRPr lang="zh-TW" altLang="en-US"/>
           </a:p>
@@ -6911,7 +7360,7 @@
           <a:p>
             <a:fld id="{D12744AA-2124-42E6-AA52-9077A6A76493}" type="datetime1">
               <a:rPr lang="zh-TW" altLang="en-US" smtClean="0"/>
-              <a:t>2025/5/18</a:t>
+              <a:t>2025/5/19</a:t>
             </a:fld>
             <a:endParaRPr lang="zh-TW" altLang="en-US" dirty="0"/>
           </a:p>
@@ -7358,8 +7807,8 @@
           </a:p>
         </p:txBody>
       </p:sp>
-      <mc:AlternateContent xmlns:mc="http://schemas.openxmlformats.org/markup-compatibility/2006">
-        <mc:Choice xmlns:a14="http://schemas.microsoft.com/office/drawing/2010/main" Requires="a14">
+      <mc:AlternateContent xmlns:mc="http://schemas.openxmlformats.org/markup-compatibility/2006" xmlns:a14="http://schemas.microsoft.com/office/drawing/2010/main">
+        <mc:Choice Requires="a14">
           <p:sp>
             <p:nvSpPr>
               <p:cNvPr id="3" name="內容版面配置區 2">
@@ -8164,7 +8613,7 @@
             </p:txBody>
           </p:sp>
         </mc:Choice>
-        <mc:Fallback>
+        <mc:Fallback xmlns="">
           <p:sp>
             <p:nvSpPr>
               <p:cNvPr id="3" name="內容版面配置區 2">
@@ -8231,7 +8680,7 @@
           <a:p>
             <a:fld id="{D12744AA-2124-42E6-AA52-9077A6A76493}" type="datetime1">
               <a:rPr lang="zh-TW" altLang="en-US" smtClean="0"/>
-              <a:t>2025/5/18</a:t>
+              <a:t>2025/5/19</a:t>
             </a:fld>
             <a:endParaRPr lang="zh-TW" altLang="en-US"/>
           </a:p>
@@ -8410,7 +8859,7 @@
           <a:p>
             <a:fld id="{D12744AA-2124-42E6-AA52-9077A6A76493}" type="datetime1">
               <a:rPr lang="zh-TW" altLang="en-US" smtClean="0"/>
-              <a:t>2025/5/18</a:t>
+              <a:t>2025/5/19</a:t>
             </a:fld>
             <a:endParaRPr lang="zh-TW" altLang="en-US"/>
           </a:p>
@@ -8538,8 +8987,8 @@
           </a:p>
         </p:txBody>
       </p:sp>
-      <mc:AlternateContent xmlns:mc="http://schemas.openxmlformats.org/markup-compatibility/2006">
-        <mc:Choice xmlns:a14="http://schemas.microsoft.com/office/drawing/2010/main" Requires="a14">
+      <mc:AlternateContent xmlns:mc="http://schemas.openxmlformats.org/markup-compatibility/2006" xmlns:a14="http://schemas.microsoft.com/office/drawing/2010/main">
+        <mc:Choice Requires="a14">
           <p:sp>
             <p:nvSpPr>
               <p:cNvPr id="3" name="內容版面配置區 2">
@@ -8680,7 +9129,7 @@
             </p:txBody>
           </p:sp>
         </mc:Choice>
-        <mc:Fallback>
+        <mc:Fallback xmlns="">
           <p:sp>
             <p:nvSpPr>
               <p:cNvPr id="3" name="內容版面配置區 2">
@@ -8747,7 +9196,7 @@
           <a:p>
             <a:fld id="{D12744AA-2124-42E6-AA52-9077A6A76493}" type="datetime1">
               <a:rPr lang="zh-TW" altLang="en-US" smtClean="0"/>
-              <a:t>2025/5/18</a:t>
+              <a:t>2025/5/19</a:t>
             </a:fld>
             <a:endParaRPr lang="zh-TW" altLang="en-US"/>
           </a:p>

</xml_diff>

<commit_message>
testbench modified to be easier to read
</commit_message>
<xml_diff>
--- a/ppt/0520.pptx
+++ b/ppt/0520.pptx
@@ -5,7 +5,7 @@
     <p:sldMasterId id="2147483660" r:id="rId1"/>
   </p:sldMasterIdLst>
   <p:notesMasterIdLst>
-    <p:notesMasterId r:id="rId13"/>
+    <p:notesMasterId r:id="rId16"/>
   </p:notesMasterIdLst>
   <p:sldIdLst>
     <p:sldId id="256" r:id="rId2"/>
@@ -18,7 +18,10 @@
     <p:sldId id="328" r:id="rId9"/>
     <p:sldId id="330" r:id="rId10"/>
     <p:sldId id="331" r:id="rId11"/>
-    <p:sldId id="332" r:id="rId12"/>
+    <p:sldId id="333" r:id="rId12"/>
+    <p:sldId id="334" r:id="rId13"/>
+    <p:sldId id="335" r:id="rId14"/>
+    <p:sldId id="332" r:id="rId15"/>
   </p:sldIdLst>
   <p:sldSz cx="12192000" cy="6858000"/>
   <p:notesSz cx="6858000" cy="9144000"/>
@@ -5413,44 +5416,422 @@
           </a:p>
         </p:txBody>
       </p:sp>
-      <p:sp>
-        <p:nvSpPr>
-          <p:cNvPr id="3" name="內容版面配置區 2">
-            <a:extLst>
-              <a:ext uri="{FF2B5EF4-FFF2-40B4-BE49-F238E27FC236}">
-                <a16:creationId xmlns:a16="http://schemas.microsoft.com/office/drawing/2014/main" id="{7F4C614D-E7FE-419C-8F98-21873BA85352}"/>
-              </a:ext>
-            </a:extLst>
-          </p:cNvPr>
-          <p:cNvSpPr>
-            <a:spLocks noGrp="1"/>
-          </p:cNvSpPr>
-          <p:nvPr>
-            <p:ph idx="1"/>
-          </p:nvPr>
-        </p:nvSpPr>
-        <p:spPr>
-          <a:xfrm>
-            <a:off x="1371599" y="1620141"/>
-            <a:ext cx="10534011" cy="730293"/>
-          </a:xfrm>
-        </p:spPr>
-        <p:txBody>
-          <a:bodyPr>
-            <a:normAutofit/>
-          </a:bodyPr>
-          <a:lstStyle/>
-          <a:p>
-            <a:r>
-              <a:rPr lang="en-US" altLang="zh-TW" dirty="0"/>
-              <a:t>The test case is (120, 120, 121, 121, … , 127, 127), the theoretical output is </a:t>
-            </a:r>
-          </a:p>
-          <a:p>
-            <a:endParaRPr lang="zh-TW" altLang="en-US" dirty="0"/>
-          </a:p>
-        </p:txBody>
-      </p:sp>
+      <mc:AlternateContent xmlns:mc="http://schemas.openxmlformats.org/markup-compatibility/2006">
+        <mc:Choice xmlns:a14="http://schemas.microsoft.com/office/drawing/2010/main" Requires="a14">
+          <p:sp>
+            <p:nvSpPr>
+              <p:cNvPr id="3" name="內容版面配置區 2">
+                <a:extLst>
+                  <a:ext uri="{FF2B5EF4-FFF2-40B4-BE49-F238E27FC236}">
+                    <a16:creationId xmlns:a16="http://schemas.microsoft.com/office/drawing/2014/main" id="{7F4C614D-E7FE-419C-8F98-21873BA85352}"/>
+                  </a:ext>
+                </a:extLst>
+              </p:cNvPr>
+              <p:cNvSpPr>
+                <a:spLocks noGrp="1"/>
+              </p:cNvSpPr>
+              <p:nvPr>
+                <p:ph idx="1"/>
+              </p:nvPr>
+            </p:nvSpPr>
+            <p:spPr>
+              <a:xfrm>
+                <a:off x="1371600" y="1620141"/>
+                <a:ext cx="10012374" cy="4884987"/>
+              </a:xfrm>
+            </p:spPr>
+            <p:txBody>
+              <a:bodyPr>
+                <a:normAutofit lnSpcReduction="10000"/>
+              </a:bodyPr>
+              <a:lstStyle/>
+              <a:p>
+                <a:r>
+                  <a:rPr lang="en-US" altLang="zh-TW" dirty="0"/>
+                  <a:t>The test case: Mimicking</a:t>
+                </a:r>
+                <a:r>
+                  <a:rPr lang="zh-TW" altLang="en-US" dirty="0"/>
+                  <a:t> </a:t>
+                </a:r>
+                <a:r>
+                  <a:rPr lang="en-US" altLang="zh-TW" dirty="0"/>
+                  <a:t>mac unit doing  </a:t>
+                </a:r>
+                <a14:m>
+                  <m:oMath xmlns:m="http://schemas.openxmlformats.org/officeDocument/2006/math">
+                    <m:d>
+                      <m:dPr>
+                        <m:ctrlPr>
+                          <a:rPr lang="en-US" altLang="zh-TW" i="1" dirty="0" smtClean="0">
+                            <a:latin typeface="Cambria Math" panose="02040503050406030204" pitchFamily="18" charset="0"/>
+                          </a:rPr>
+                        </m:ctrlPr>
+                      </m:dPr>
+                      <m:e>
+                        <m:r>
+                          <a:rPr lang="en-US" altLang="zh-TW" i="1" dirty="0" smtClean="0">
+                            <a:latin typeface="Cambria Math" panose="02040503050406030204" pitchFamily="18" charset="0"/>
+                          </a:rPr>
+                          <m:t>4900, 5600</m:t>
+                        </m:r>
+                      </m:e>
+                    </m:d>
+                    <m:r>
+                      <a:rPr lang="en-US" altLang="zh-TW" b="0" i="1" dirty="0" smtClean="0">
+                        <a:latin typeface="Cambria Math" panose="02040503050406030204" pitchFamily="18" charset="0"/>
+                      </a:rPr>
+                      <m:t>⋅</m:t>
+                    </m:r>
+                    <m:r>
+                      <a:rPr lang="en-US" altLang="zh-TW" i="1" dirty="0" smtClean="0">
+                        <a:latin typeface="Cambria Math" panose="02040503050406030204" pitchFamily="18" charset="0"/>
+                      </a:rPr>
+                      <m:t>(2800, 6300) </m:t>
+                    </m:r>
+                  </m:oMath>
+                </a14:m>
+                <a:r>
+                  <a:rPr lang="en-US" altLang="zh-TW" dirty="0"/>
+                  <a:t>and </a:t>
+                </a:r>
+                <a14:m>
+                  <m:oMath xmlns:m="http://schemas.openxmlformats.org/officeDocument/2006/math">
+                    <m:d>
+                      <m:dPr>
+                        <m:ctrlPr>
+                          <a:rPr lang="en-US" altLang="zh-TW" i="1" dirty="0" smtClean="0">
+                            <a:latin typeface="Cambria Math" panose="02040503050406030204" pitchFamily="18" charset="0"/>
+                          </a:rPr>
+                        </m:ctrlPr>
+                      </m:dPr>
+                      <m:e>
+                        <m:r>
+                          <a:rPr lang="en-US" altLang="zh-TW" i="1" dirty="0" smtClean="0">
+                            <a:latin typeface="Cambria Math" panose="02040503050406030204" pitchFamily="18" charset="0"/>
+                          </a:rPr>
+                          <m:t>42000, 49000</m:t>
+                        </m:r>
+                      </m:e>
+                    </m:d>
+                    <m:r>
+                      <a:rPr lang="en-US" altLang="zh-TW" b="0" i="1" dirty="0" smtClean="0">
+                        <a:latin typeface="Cambria Math" panose="02040503050406030204" pitchFamily="18" charset="0"/>
+                      </a:rPr>
+                      <m:t>⋅</m:t>
+                    </m:r>
+                    <m:r>
+                      <a:rPr lang="en-US" altLang="zh-TW" i="1" dirty="0" smtClean="0">
+                        <a:latin typeface="Cambria Math" panose="02040503050406030204" pitchFamily="18" charset="0"/>
+                      </a:rPr>
+                      <m:t>(3500, 5600)</m:t>
+                    </m:r>
+                  </m:oMath>
+                </a14:m>
+                <a:endParaRPr lang="en-US" altLang="zh-TW" dirty="0"/>
+              </a:p>
+              <a:p>
+                <a:r>
+                  <a:rPr lang="en-US" altLang="zh-TW" dirty="0"/>
+                  <a:t>Quantized int4 data: </a:t>
+                </a:r>
+                <a14:m>
+                  <m:oMath xmlns:m="http://schemas.openxmlformats.org/officeDocument/2006/math">
+                    <m:d>
+                      <m:dPr>
+                        <m:ctrlPr>
+                          <a:rPr lang="en-US" altLang="zh-TW" i="1" dirty="0" smtClean="0">
+                            <a:latin typeface="Cambria Math" panose="02040503050406030204" pitchFamily="18" charset="0"/>
+                          </a:rPr>
+                        </m:ctrlPr>
+                      </m:dPr>
+                      <m:e>
+                        <m:r>
+                          <a:rPr lang="en-US" altLang="zh-TW" i="1" dirty="0" smtClean="0">
+                            <a:latin typeface="Cambria Math" panose="02040503050406030204" pitchFamily="18" charset="0"/>
+                          </a:rPr>
+                          <m:t>6, 7</m:t>
+                        </m:r>
+                      </m:e>
+                    </m:d>
+                    <m:r>
+                      <a:rPr lang="en-US" altLang="zh-TW" b="0" i="1" dirty="0" smtClean="0">
+                        <a:latin typeface="Cambria Math" panose="02040503050406030204" pitchFamily="18" charset="0"/>
+                      </a:rPr>
+                      <m:t>×</m:t>
+                    </m:r>
+                    <m:r>
+                      <a:rPr lang="en-US" altLang="zh-TW" i="1" dirty="0" smtClean="0">
+                        <a:latin typeface="Cambria Math" panose="02040503050406030204" pitchFamily="18" charset="0"/>
+                      </a:rPr>
+                      <m:t>(3, 7) </m:t>
+                    </m:r>
+                  </m:oMath>
+                </a14:m>
+                <a:r>
+                  <a:rPr lang="en-US" altLang="zh-TW" dirty="0"/>
+                  <a:t>and </a:t>
+                </a:r>
+                <a14:m>
+                  <m:oMath xmlns:m="http://schemas.openxmlformats.org/officeDocument/2006/math">
+                    <m:d>
+                      <m:dPr>
+                        <m:ctrlPr>
+                          <a:rPr lang="en-US" altLang="zh-TW" i="1" dirty="0" smtClean="0">
+                            <a:latin typeface="Cambria Math" panose="02040503050406030204" pitchFamily="18" charset="0"/>
+                          </a:rPr>
+                        </m:ctrlPr>
+                      </m:dPr>
+                      <m:e>
+                        <m:r>
+                          <a:rPr lang="en-US" altLang="zh-TW" i="1" dirty="0" smtClean="0">
+                            <a:latin typeface="Cambria Math" panose="02040503050406030204" pitchFamily="18" charset="0"/>
+                          </a:rPr>
+                          <m:t>6, 7</m:t>
+                        </m:r>
+                      </m:e>
+                    </m:d>
+                    <m:r>
+                      <a:rPr lang="en-US" altLang="zh-TW" b="0" i="1" dirty="0" smtClean="0">
+                        <a:latin typeface="Cambria Math" panose="02040503050406030204" pitchFamily="18" charset="0"/>
+                      </a:rPr>
+                      <m:t>×</m:t>
+                    </m:r>
+                    <m:d>
+                      <m:dPr>
+                        <m:ctrlPr>
+                          <a:rPr lang="en-US" altLang="zh-TW" i="1" dirty="0" smtClean="0">
+                            <a:latin typeface="Cambria Math" panose="02040503050406030204" pitchFamily="18" charset="0"/>
+                          </a:rPr>
+                        </m:ctrlPr>
+                      </m:dPr>
+                      <m:e>
+                        <m:r>
+                          <a:rPr lang="en-US" altLang="zh-TW" i="1" dirty="0" smtClean="0">
+                            <a:latin typeface="Cambria Math" panose="02040503050406030204" pitchFamily="18" charset="0"/>
+                          </a:rPr>
+                          <m:t>4, 7</m:t>
+                        </m:r>
+                      </m:e>
+                    </m:d>
+                  </m:oMath>
+                </a14:m>
+                <a:r>
+                  <a:rPr lang="en-US" altLang="zh-TW" dirty="0"/>
+                  <a:t>, scale factor are (800, 900) and (7000, 800)</a:t>
+                </a:r>
+              </a:p>
+              <a:p>
+                <a:r>
+                  <a:rPr lang="en-US" altLang="zh-TW" dirty="0"/>
+                  <a:t>CS: 55.11811024 = 0x65 in FP8</a:t>
+                </a:r>
+              </a:p>
+              <a:p>
+                <a:r>
+                  <a:rPr lang="en-US" altLang="zh-TW" dirty="0"/>
+                  <a:t>VSs: (14, 16) and (127, 14)</a:t>
+                </a:r>
+              </a:p>
+              <a:p>
+                <a:r>
+                  <a:rPr lang="en-US" altLang="zh-TW" dirty="0"/>
+                  <a:t>Output of mac should be </a:t>
+                </a:r>
+                <a14:m>
+                  <m:oMath xmlns:m="http://schemas.openxmlformats.org/officeDocument/2006/math">
+                    <m:d>
+                      <m:dPr>
+                        <m:ctrlPr>
+                          <a:rPr lang="en-US" altLang="zh-TW" i="1" dirty="0" smtClean="0">
+                            <a:latin typeface="Cambria Math" panose="02040503050406030204" pitchFamily="18" charset="0"/>
+                          </a:rPr>
+                        </m:ctrlPr>
+                      </m:dPr>
+                      <m:e>
+                        <m:r>
+                          <a:rPr lang="en-US" altLang="zh-TW" i="1" dirty="0" smtClean="0">
+                            <a:latin typeface="Cambria Math" panose="02040503050406030204" pitchFamily="18" charset="0"/>
+                          </a:rPr>
+                          <m:t>6</m:t>
+                        </m:r>
+                        <m:r>
+                          <a:rPr lang="en-US" altLang="zh-TW" b="0" i="1" dirty="0" smtClean="0">
+                            <a:latin typeface="Cambria Math" panose="02040503050406030204" pitchFamily="18" charset="0"/>
+                          </a:rPr>
+                          <m:t>×</m:t>
+                        </m:r>
+                        <m:r>
+                          <a:rPr lang="en-US" altLang="zh-TW" i="1" dirty="0" smtClean="0">
+                            <a:latin typeface="Cambria Math" panose="02040503050406030204" pitchFamily="18" charset="0"/>
+                          </a:rPr>
+                          <m:t>3 +</m:t>
+                        </m:r>
+                        <m:r>
+                          <a:rPr lang="en-US" altLang="zh-TW" b="0" i="1" dirty="0" smtClean="0">
+                            <a:latin typeface="Cambria Math" panose="02040503050406030204" pitchFamily="18" charset="0"/>
+                          </a:rPr>
+                          <m:t>7×</m:t>
+                        </m:r>
+                        <m:r>
+                          <a:rPr lang="en-US" altLang="zh-TW" i="1" dirty="0" smtClean="0">
+                            <a:latin typeface="Cambria Math" panose="02040503050406030204" pitchFamily="18" charset="0"/>
+                          </a:rPr>
+                          <m:t>7</m:t>
+                        </m:r>
+                      </m:e>
+                    </m:d>
+                    <m:r>
+                      <a:rPr lang="en-US" altLang="zh-TW" b="0" i="1" dirty="0" smtClean="0">
+                        <a:latin typeface="Cambria Math" panose="02040503050406030204" pitchFamily="18" charset="0"/>
+                      </a:rPr>
+                      <m:t>×</m:t>
+                    </m:r>
+                    <m:r>
+                      <a:rPr lang="en-US" altLang="zh-TW" i="1" dirty="0" smtClean="0">
+                        <a:latin typeface="Cambria Math" panose="02040503050406030204" pitchFamily="18" charset="0"/>
+                      </a:rPr>
+                      <m:t>14</m:t>
+                    </m:r>
+                    <m:r>
+                      <a:rPr lang="en-US" altLang="zh-TW" b="0" i="1" dirty="0" smtClean="0">
+                        <a:latin typeface="Cambria Math" panose="02040503050406030204" pitchFamily="18" charset="0"/>
+                      </a:rPr>
+                      <m:t>×</m:t>
+                    </m:r>
+                    <m:r>
+                      <a:rPr lang="en-US" altLang="zh-TW" i="1" dirty="0" smtClean="0">
+                        <a:latin typeface="Cambria Math" panose="02040503050406030204" pitchFamily="18" charset="0"/>
+                      </a:rPr>
+                      <m:t>16 = 15008 </m:t>
+                    </m:r>
+                  </m:oMath>
+                </a14:m>
+                <a:r>
+                  <a:rPr lang="en-US" altLang="zh-TW" dirty="0"/>
+                  <a:t>and </a:t>
+                </a:r>
+                <a14:m>
+                  <m:oMath xmlns:m="http://schemas.openxmlformats.org/officeDocument/2006/math">
+                    <m:d>
+                      <m:dPr>
+                        <m:ctrlPr>
+                          <a:rPr lang="en-US" altLang="zh-TW" i="1" dirty="0" smtClean="0">
+                            <a:latin typeface="Cambria Math" panose="02040503050406030204" pitchFamily="18" charset="0"/>
+                          </a:rPr>
+                        </m:ctrlPr>
+                      </m:dPr>
+                      <m:e>
+                        <m:r>
+                          <a:rPr lang="en-US" altLang="zh-TW" i="1" dirty="0" smtClean="0">
+                            <a:latin typeface="Cambria Math" panose="02040503050406030204" pitchFamily="18" charset="0"/>
+                          </a:rPr>
+                          <m:t>6</m:t>
+                        </m:r>
+                        <m:r>
+                          <a:rPr lang="en-US" altLang="zh-TW" b="0" i="1" dirty="0" smtClean="0">
+                            <a:latin typeface="Cambria Math" panose="02040503050406030204" pitchFamily="18" charset="0"/>
+                          </a:rPr>
+                          <m:t>×</m:t>
+                        </m:r>
+                        <m:r>
+                          <a:rPr lang="en-US" altLang="zh-TW" i="1" dirty="0" smtClean="0">
+                            <a:latin typeface="Cambria Math" panose="02040503050406030204" pitchFamily="18" charset="0"/>
+                          </a:rPr>
+                          <m:t>4 + 7</m:t>
+                        </m:r>
+                        <m:r>
+                          <a:rPr lang="en-US" altLang="zh-TW" b="0" i="1" dirty="0" smtClean="0">
+                            <a:latin typeface="Cambria Math" panose="02040503050406030204" pitchFamily="18" charset="0"/>
+                          </a:rPr>
+                          <m:t>×</m:t>
+                        </m:r>
+                        <m:r>
+                          <a:rPr lang="en-US" altLang="zh-TW" i="1" dirty="0" smtClean="0">
+                            <a:latin typeface="Cambria Math" panose="02040503050406030204" pitchFamily="18" charset="0"/>
+                          </a:rPr>
+                          <m:t>7</m:t>
+                        </m:r>
+                      </m:e>
+                    </m:d>
+                    <m:r>
+                      <a:rPr lang="en-US" altLang="zh-TW" b="0" i="1" dirty="0" smtClean="0">
+                        <a:latin typeface="Cambria Math" panose="02040503050406030204" pitchFamily="18" charset="0"/>
+                      </a:rPr>
+                      <m:t>×</m:t>
+                    </m:r>
+                    <m:r>
+                      <a:rPr lang="en-US" altLang="zh-TW" i="1" dirty="0" smtClean="0">
+                        <a:latin typeface="Cambria Math" panose="02040503050406030204" pitchFamily="18" charset="0"/>
+                      </a:rPr>
+                      <m:t>127</m:t>
+                    </m:r>
+                    <m:r>
+                      <a:rPr lang="en-US" altLang="zh-TW" b="0" i="1" dirty="0" smtClean="0">
+                        <a:latin typeface="Cambria Math" panose="02040503050406030204" pitchFamily="18" charset="0"/>
+                      </a:rPr>
+                      <m:t>×</m:t>
+                    </m:r>
+                    <m:r>
+                      <a:rPr lang="en-US" altLang="zh-TW" i="1" dirty="0" smtClean="0">
+                        <a:latin typeface="Cambria Math" panose="02040503050406030204" pitchFamily="18" charset="0"/>
+                      </a:rPr>
+                      <m:t>14 = 129794</m:t>
+                    </m:r>
+                  </m:oMath>
+                </a14:m>
+                <a:endParaRPr lang="en-US" altLang="zh-TW" dirty="0"/>
+              </a:p>
+              <a:p>
+                <a:endParaRPr lang="zh-TW" altLang="en-US" dirty="0"/>
+              </a:p>
+            </p:txBody>
+          </p:sp>
+        </mc:Choice>
+        <mc:Fallback>
+          <p:sp>
+            <p:nvSpPr>
+              <p:cNvPr id="3" name="內容版面配置區 2">
+                <a:extLst>
+                  <a:ext uri="{FF2B5EF4-FFF2-40B4-BE49-F238E27FC236}">
+                    <a16:creationId xmlns:a16="http://schemas.microsoft.com/office/drawing/2014/main" id="{7F4C614D-E7FE-419C-8F98-21873BA85352}"/>
+                  </a:ext>
+                </a:extLst>
+              </p:cNvPr>
+              <p:cNvSpPr>
+                <a:spLocks noGrp="1" noRot="1" noChangeAspect="1" noMove="1" noResize="1" noEditPoints="1" noAdjustHandles="1" noChangeArrowheads="1" noChangeShapeType="1" noTextEdit="1"/>
+              </p:cNvSpPr>
+              <p:nvPr>
+                <p:ph idx="1"/>
+              </p:nvPr>
+            </p:nvSpPr>
+            <p:spPr>
+              <a:xfrm>
+                <a:off x="1371600" y="1620141"/>
+                <a:ext cx="10012374" cy="4884987"/>
+              </a:xfrm>
+              <a:blipFill>
+                <a:blip r:embed="rId2"/>
+                <a:stretch>
+                  <a:fillRect l="-853" r="-670"/>
+                </a:stretch>
+              </a:blipFill>
+            </p:spPr>
+            <p:txBody>
+              <a:bodyPr/>
+              <a:lstStyle/>
+              <a:p>
+                <a:r>
+                  <a:rPr lang="zh-TW" altLang="en-US">
+                    <a:noFill/>
+                  </a:rPr>
+                  <a:t> </a:t>
+                </a:r>
+              </a:p>
+            </p:txBody>
+          </p:sp>
+        </mc:Fallback>
+      </mc:AlternateContent>
       <p:sp>
         <p:nvSpPr>
           <p:cNvPr id="4" name="日期版面配置區 3">
@@ -5509,230 +5890,1518 @@
           </a:p>
         </p:txBody>
       </p:sp>
-      <p:sp>
-        <p:nvSpPr>
-          <p:cNvPr id="15" name="內容版面配置區 2">
+    </p:spTree>
+    <p:extLst>
+      <p:ext uri="{BB962C8B-B14F-4D97-AF65-F5344CB8AC3E}">
+        <p14:creationId xmlns:p14="http://schemas.microsoft.com/office/powerpoint/2010/main" val="1717373273"/>
+      </p:ext>
+    </p:extLst>
+  </p:cSld>
+  <p:clrMapOvr>
+    <a:masterClrMapping/>
+  </p:clrMapOvr>
+</p:sld>
+</file>
+
+<file path=ppt/slides/slide12.xml><?xml version="1.0" encoding="utf-8"?>
+<p:sld xmlns:a="http://schemas.openxmlformats.org/drawingml/2006/main" xmlns:r="http://schemas.openxmlformats.org/officeDocument/2006/relationships" xmlns:p="http://schemas.openxmlformats.org/presentationml/2006/main">
+  <p:cSld>
+    <p:spTree>
+      <p:nvGrpSpPr>
+        <p:cNvPr id="1" name=""/>
+        <p:cNvGrpSpPr/>
+        <p:nvPr/>
+      </p:nvGrpSpPr>
+      <p:grpSpPr>
+        <a:xfrm>
+          <a:off x="0" y="0"/>
+          <a:ext cx="0" cy="0"/>
+          <a:chOff x="0" y="0"/>
+          <a:chExt cx="0" cy="0"/>
+        </a:xfrm>
+      </p:grpSpPr>
+      <p:sp>
+        <p:nvSpPr>
+          <p:cNvPr id="2" name="標題 1">
             <a:extLst>
               <a:ext uri="{FF2B5EF4-FFF2-40B4-BE49-F238E27FC236}">
-                <a16:creationId xmlns:a16="http://schemas.microsoft.com/office/drawing/2014/main" id="{BA214C04-2EFC-4059-95D0-F675C135009A}"/>
+                <a16:creationId xmlns:a16="http://schemas.microsoft.com/office/drawing/2014/main" id="{2A030E4E-6B6F-428D-88BC-5A6D82AE1AAF}"/>
               </a:ext>
             </a:extLst>
           </p:cNvPr>
-          <p:cNvSpPr txBox="1">
-            <a:spLocks/>
+          <p:cNvSpPr>
+            <a:spLocks noGrp="1"/>
           </p:cNvSpPr>
-          <p:nvPr/>
+          <p:nvPr>
+            <p:ph type="title"/>
+          </p:nvPr>
         </p:nvSpPr>
         <p:spPr>
           <a:xfrm>
-            <a:off x="1371598" y="2554482"/>
-            <a:ext cx="10534011" cy="730293"/>
+            <a:off x="1371600" y="685800"/>
+            <a:ext cx="9601200" cy="879113"/>
+          </a:xfrm>
+        </p:spPr>
+        <p:txBody>
+          <a:bodyPr/>
+          <a:lstStyle/>
+          <a:p>
+            <a:r>
+              <a:rPr lang="en-US" altLang="zh-TW" dirty="0"/>
+              <a:t>Theoretical Output of PPU</a:t>
+            </a:r>
+            <a:endParaRPr lang="zh-TW" altLang="en-US" dirty="0"/>
+          </a:p>
+        </p:txBody>
+      </p:sp>
+      <mc:AlternateContent xmlns:mc="http://schemas.openxmlformats.org/markup-compatibility/2006">
+        <mc:Choice xmlns:a14="http://schemas.microsoft.com/office/drawing/2010/main" Requires="a14">
+          <p:sp>
+            <p:nvSpPr>
+              <p:cNvPr id="3" name="內容版面配置區 2">
+                <a:extLst>
+                  <a:ext uri="{FF2B5EF4-FFF2-40B4-BE49-F238E27FC236}">
+                    <a16:creationId xmlns:a16="http://schemas.microsoft.com/office/drawing/2014/main" id="{7F4C614D-E7FE-419C-8F98-21873BA85352}"/>
+                  </a:ext>
+                </a:extLst>
+              </p:cNvPr>
+              <p:cNvSpPr>
+                <a:spLocks noGrp="1"/>
+              </p:cNvSpPr>
+              <p:nvPr>
+                <p:ph idx="1"/>
+              </p:nvPr>
+            </p:nvSpPr>
+            <p:spPr>
+              <a:xfrm>
+                <a:off x="1371599" y="1620141"/>
+                <a:ext cx="10534011" cy="5069094"/>
+              </a:xfrm>
+            </p:spPr>
+            <p:txBody>
+              <a:bodyPr>
+                <a:normAutofit/>
+              </a:bodyPr>
+              <a:lstStyle/>
+              <a:p>
+                <a:r>
+                  <a:rPr lang="en-US" altLang="zh-TW" dirty="0"/>
+                  <a:t>scaled sum: </a:t>
+                </a:r>
+                <a14:m>
+                  <m:oMath xmlns:m="http://schemas.openxmlformats.org/officeDocument/2006/math">
+                    <m:r>
+                      <a:rPr lang="en-US" altLang="zh-TW" i="1" dirty="0" smtClean="0">
+                        <a:latin typeface="Cambria Math" panose="02040503050406030204" pitchFamily="18" charset="0"/>
+                      </a:rPr>
+                      <m:t>15008</m:t>
+                    </m:r>
+                    <m:r>
+                      <a:rPr lang="en-US" altLang="zh-TW" b="0" i="1" dirty="0" smtClean="0">
+                        <a:latin typeface="Cambria Math" panose="02040503050406030204" pitchFamily="18" charset="0"/>
+                      </a:rPr>
+                      <m:t>×</m:t>
+                    </m:r>
+                    <m:r>
+                      <a:rPr lang="en-US" altLang="zh-TW" i="1" dirty="0" smtClean="0">
+                        <a:latin typeface="Cambria Math" panose="02040503050406030204" pitchFamily="18" charset="0"/>
+                      </a:rPr>
+                      <m:t>0</m:t>
+                    </m:r>
+                    <m:r>
+                      <a:rPr lang="en-US" altLang="zh-TW" i="1" dirty="0" smtClean="0">
+                        <a:latin typeface="Cambria Math" panose="02040503050406030204" pitchFamily="18" charset="0"/>
+                      </a:rPr>
+                      <m:t>𝑥</m:t>
+                    </m:r>
+                    <m:r>
+                      <a:rPr lang="en-US" altLang="zh-TW" i="1" dirty="0" smtClean="0">
+                        <a:latin typeface="Cambria Math" panose="02040503050406030204" pitchFamily="18" charset="0"/>
+                      </a:rPr>
+                      <m:t>65× 0</m:t>
+                    </m:r>
+                    <m:r>
+                      <a:rPr lang="en-US" altLang="zh-TW" i="1" dirty="0" smtClean="0">
+                        <a:latin typeface="Cambria Math" panose="02040503050406030204" pitchFamily="18" charset="0"/>
+                      </a:rPr>
+                      <m:t>𝑥</m:t>
+                    </m:r>
+                    <m:r>
+                      <a:rPr lang="en-US" altLang="zh-TW" i="1" dirty="0" smtClean="0">
+                        <a:latin typeface="Cambria Math" panose="02040503050406030204" pitchFamily="18" charset="0"/>
+                      </a:rPr>
+                      <m:t>65÷ </m:t>
+                    </m:r>
+                    <m:sSup>
+                      <m:sSupPr>
+                        <m:ctrlPr>
+                          <a:rPr lang="en-US" altLang="zh-TW" i="1" dirty="0" smtClean="0">
+                            <a:latin typeface="Cambria Math" panose="02040503050406030204" pitchFamily="18" charset="0"/>
+                          </a:rPr>
+                        </m:ctrlPr>
+                      </m:sSupPr>
+                      <m:e>
+                        <m:r>
+                          <a:rPr lang="en-US" altLang="zh-TW" i="1" dirty="0" smtClean="0">
+                            <a:latin typeface="Cambria Math" panose="02040503050406030204" pitchFamily="18" charset="0"/>
+                          </a:rPr>
+                          <m:t>2</m:t>
+                        </m:r>
+                      </m:e>
+                      <m:sup>
+                        <m:r>
+                          <a:rPr lang="en-US" altLang="zh-TW" i="1" dirty="0" smtClean="0">
+                            <a:latin typeface="Cambria Math" panose="02040503050406030204" pitchFamily="18" charset="0"/>
+                          </a:rPr>
+                          <m:t>16</m:t>
+                        </m:r>
+                      </m:sup>
+                    </m:sSup>
+                    <m:r>
+                      <a:rPr lang="en-US" altLang="zh-TW" i="1" dirty="0" smtClean="0">
+                        <a:latin typeface="Cambria Math" panose="02040503050406030204" pitchFamily="18" charset="0"/>
+                      </a:rPr>
+                      <m:t> </m:t>
+                    </m:r>
+                  </m:oMath>
+                </a14:m>
+                <a:r>
+                  <a:rPr lang="en-US" altLang="zh-TW" dirty="0"/>
+                  <a:t>in Q8.8 = 40581632 and</a:t>
+                </a:r>
+              </a:p>
+              <a:p>
+                <a:pPr marL="0" indent="0">
+                  <a:buNone/>
+                </a:pPr>
+                <a:r>
+                  <a:rPr lang="en-US" altLang="zh-TW" dirty="0"/>
+                  <a:t>                         </a:t>
+                </a:r>
+                <a14:m>
+                  <m:oMath xmlns:m="http://schemas.openxmlformats.org/officeDocument/2006/math">
+                    <m:r>
+                      <a:rPr lang="en-US" altLang="zh-TW" i="1" dirty="0" smtClean="0">
+                        <a:latin typeface="Cambria Math" panose="02040503050406030204" pitchFamily="18" charset="0"/>
+                      </a:rPr>
+                      <m:t>1</m:t>
+                    </m:r>
+                    <m:r>
+                      <a:rPr lang="en-US" altLang="zh-TW" b="0" i="1" dirty="0" smtClean="0">
+                        <a:latin typeface="Cambria Math" panose="02040503050406030204" pitchFamily="18" charset="0"/>
+                      </a:rPr>
+                      <m:t>29794</m:t>
+                    </m:r>
+                    <m:r>
+                      <a:rPr lang="en-US" altLang="zh-TW" b="0" i="1" dirty="0" smtClean="0">
+                        <a:latin typeface="Cambria Math" panose="02040503050406030204" pitchFamily="18" charset="0"/>
+                      </a:rPr>
+                      <m:t>×</m:t>
+                    </m:r>
+                    <m:r>
+                      <a:rPr lang="en-US" altLang="zh-TW" i="1" dirty="0" smtClean="0">
+                        <a:latin typeface="Cambria Math" panose="02040503050406030204" pitchFamily="18" charset="0"/>
+                      </a:rPr>
+                      <m:t>0</m:t>
+                    </m:r>
+                    <m:r>
+                      <a:rPr lang="en-US" altLang="zh-TW" i="1" dirty="0" smtClean="0">
+                        <a:latin typeface="Cambria Math" panose="02040503050406030204" pitchFamily="18" charset="0"/>
+                      </a:rPr>
+                      <m:t>𝑥</m:t>
+                    </m:r>
+                    <m:r>
+                      <a:rPr lang="en-US" altLang="zh-TW" i="1" dirty="0" smtClean="0">
+                        <a:latin typeface="Cambria Math" panose="02040503050406030204" pitchFamily="18" charset="0"/>
+                      </a:rPr>
+                      <m:t>65× 0</m:t>
+                    </m:r>
+                    <m:r>
+                      <a:rPr lang="en-US" altLang="zh-TW" i="1" dirty="0" smtClean="0">
+                        <a:latin typeface="Cambria Math" panose="02040503050406030204" pitchFamily="18" charset="0"/>
+                      </a:rPr>
+                      <m:t>𝑥</m:t>
+                    </m:r>
+                    <m:r>
+                      <a:rPr lang="en-US" altLang="zh-TW" i="1" dirty="0" smtClean="0">
+                        <a:latin typeface="Cambria Math" panose="02040503050406030204" pitchFamily="18" charset="0"/>
+                      </a:rPr>
+                      <m:t>65÷ </m:t>
+                    </m:r>
+                    <m:sSup>
+                      <m:sSupPr>
+                        <m:ctrlPr>
+                          <a:rPr lang="en-US" altLang="zh-TW" i="1" dirty="0" smtClean="0">
+                            <a:latin typeface="Cambria Math" panose="02040503050406030204" pitchFamily="18" charset="0"/>
+                          </a:rPr>
+                        </m:ctrlPr>
+                      </m:sSupPr>
+                      <m:e>
+                        <m:r>
+                          <a:rPr lang="en-US" altLang="zh-TW" i="1" dirty="0" smtClean="0">
+                            <a:latin typeface="Cambria Math" panose="02040503050406030204" pitchFamily="18" charset="0"/>
+                          </a:rPr>
+                          <m:t>2</m:t>
+                        </m:r>
+                      </m:e>
+                      <m:sup>
+                        <m:r>
+                          <a:rPr lang="en-US" altLang="zh-TW" i="1" dirty="0" smtClean="0">
+                            <a:latin typeface="Cambria Math" panose="02040503050406030204" pitchFamily="18" charset="0"/>
+                          </a:rPr>
+                          <m:t>16</m:t>
+                        </m:r>
+                      </m:sup>
+                    </m:sSup>
+                    <m:r>
+                      <a:rPr lang="en-US" altLang="zh-TW" i="1" dirty="0" smtClean="0">
+                        <a:latin typeface="Cambria Math" panose="02040503050406030204" pitchFamily="18" charset="0"/>
+                      </a:rPr>
+                      <m:t> </m:t>
+                    </m:r>
+                  </m:oMath>
+                </a14:m>
+                <a:r>
+                  <a:rPr lang="en-US" altLang="zh-TW" dirty="0"/>
+                  <a:t>in Q8.8 = 350962976</a:t>
+                </a:r>
+              </a:p>
+              <a:p>
+                <a:r>
+                  <a:rPr lang="en-US" altLang="zh-TW" dirty="0"/>
+                  <a:t>Truncated value: 2 and 20 (high 16 bits)</a:t>
+                </a:r>
+              </a:p>
+              <a:p>
+                <a:r>
+                  <a:rPr lang="en-US" altLang="zh-TW" dirty="0"/>
+                  <a:t>Max value: 20</a:t>
+                </a:r>
+              </a:p>
+              <a:p>
+                <a:r>
+                  <a:rPr lang="en-US" altLang="zh-TW" dirty="0"/>
+                  <a:t>Quantized data:  </a:t>
+                </a:r>
+                <a14:m>
+                  <m:oMath xmlns:m="http://schemas.openxmlformats.org/officeDocument/2006/math">
+                    <m:r>
+                      <a:rPr lang="en-US" altLang="zh-TW" i="1" dirty="0" smtClean="0">
+                        <a:latin typeface="Cambria Math" panose="02040503050406030204" pitchFamily="18" charset="0"/>
+                      </a:rPr>
+                      <m:t>2</m:t>
+                    </m:r>
+                    <m:r>
+                      <a:rPr lang="en-US" altLang="zh-TW" b="0" i="1" dirty="0" smtClean="0">
+                        <a:latin typeface="Cambria Math" panose="02040503050406030204" pitchFamily="18" charset="0"/>
+                      </a:rPr>
+                      <m:t>×</m:t>
+                    </m:r>
+                    <m:f>
+                      <m:fPr>
+                        <m:ctrlPr>
+                          <a:rPr lang="en-US" altLang="zh-TW" i="1" dirty="0" smtClean="0">
+                            <a:latin typeface="Cambria Math" panose="02040503050406030204" pitchFamily="18" charset="0"/>
+                          </a:rPr>
+                        </m:ctrlPr>
+                      </m:fPr>
+                      <m:num>
+                        <m:r>
+                          <a:rPr lang="en-US" altLang="zh-TW" b="0" i="1" dirty="0" smtClean="0">
+                            <a:latin typeface="Cambria Math" panose="02040503050406030204" pitchFamily="18" charset="0"/>
+                          </a:rPr>
+                          <m:t>255</m:t>
+                        </m:r>
+                      </m:num>
+                      <m:den>
+                        <m:r>
+                          <a:rPr lang="en-US" altLang="zh-TW" b="0" i="1" dirty="0" smtClean="0">
+                            <a:latin typeface="Cambria Math" panose="02040503050406030204" pitchFamily="18" charset="0"/>
+                          </a:rPr>
+                          <m:t>20</m:t>
+                        </m:r>
+                      </m:den>
+                    </m:f>
+                    <m:r>
+                      <a:rPr lang="en-US" altLang="zh-TW" b="0" i="0" dirty="0" smtClean="0">
+                        <a:latin typeface="Cambria Math" panose="02040503050406030204" pitchFamily="18" charset="0"/>
+                      </a:rPr>
+                      <m:t>=25</m:t>
+                    </m:r>
+                  </m:oMath>
+                </a14:m>
+                <a:r>
+                  <a:rPr lang="en-US" altLang="zh-TW" dirty="0"/>
+                  <a:t>  and </a:t>
+                </a:r>
+                <a14:m>
+                  <m:oMath xmlns:m="http://schemas.openxmlformats.org/officeDocument/2006/math">
+                    <m:r>
+                      <a:rPr lang="en-US" altLang="zh-TW" i="1" dirty="0">
+                        <a:latin typeface="Cambria Math" panose="02040503050406030204" pitchFamily="18" charset="0"/>
+                      </a:rPr>
+                      <m:t>2</m:t>
+                    </m:r>
+                    <m:r>
+                      <a:rPr lang="en-US" altLang="zh-TW" b="0" i="1" dirty="0" smtClean="0">
+                        <a:latin typeface="Cambria Math" panose="02040503050406030204" pitchFamily="18" charset="0"/>
+                      </a:rPr>
+                      <m:t>0</m:t>
+                    </m:r>
+                    <m:r>
+                      <a:rPr lang="en-US" altLang="zh-TW" i="1" dirty="0">
+                        <a:latin typeface="Cambria Math" panose="02040503050406030204" pitchFamily="18" charset="0"/>
+                      </a:rPr>
+                      <m:t>×</m:t>
+                    </m:r>
+                    <m:f>
+                      <m:fPr>
+                        <m:ctrlPr>
+                          <a:rPr lang="en-US" altLang="zh-TW" i="1" dirty="0">
+                            <a:latin typeface="Cambria Math" panose="02040503050406030204" pitchFamily="18" charset="0"/>
+                          </a:rPr>
+                        </m:ctrlPr>
+                      </m:fPr>
+                      <m:num>
+                        <m:r>
+                          <a:rPr lang="en-US" altLang="zh-TW" i="1" dirty="0">
+                            <a:latin typeface="Cambria Math" panose="02040503050406030204" pitchFamily="18" charset="0"/>
+                          </a:rPr>
+                          <m:t>255</m:t>
+                        </m:r>
+                      </m:num>
+                      <m:den>
+                        <m:r>
+                          <a:rPr lang="en-US" altLang="zh-TW" i="1" dirty="0">
+                            <a:latin typeface="Cambria Math" panose="02040503050406030204" pitchFamily="18" charset="0"/>
+                          </a:rPr>
+                          <m:t>20</m:t>
+                        </m:r>
+                      </m:den>
+                    </m:f>
+                    <m:r>
+                      <a:rPr lang="en-US" altLang="zh-TW" dirty="0">
+                        <a:latin typeface="Cambria Math" panose="02040503050406030204" pitchFamily="18" charset="0"/>
+                      </a:rPr>
+                      <m:t>=25</m:t>
+                    </m:r>
+                    <m:r>
+                      <a:rPr lang="en-US" altLang="zh-TW" b="0" i="0" dirty="0" smtClean="0">
+                        <a:latin typeface="Cambria Math" panose="02040503050406030204" pitchFamily="18" charset="0"/>
+                      </a:rPr>
+                      <m:t>5</m:t>
+                    </m:r>
+                  </m:oMath>
+                </a14:m>
+                <a:r>
+                  <a:rPr lang="en-US" altLang="zh-TW" dirty="0"/>
+                  <a:t> </a:t>
+                </a:r>
+              </a:p>
+              <a:p>
+                <a:r>
+                  <a:rPr lang="en-US" altLang="zh-TW" dirty="0" err="1"/>
+                  <a:t>Approx</a:t>
+                </a:r>
+                <a:r>
+                  <a:rPr lang="en-US" altLang="zh-TW" dirty="0"/>
+                  <a:t> </a:t>
+                </a:r>
+                <a:r>
+                  <a:rPr lang="en-US" altLang="zh-TW" dirty="0" err="1"/>
+                  <a:t>softemax</a:t>
+                </a:r>
+                <a:r>
+                  <a:rPr lang="en-US" altLang="zh-TW" dirty="0"/>
+                  <a:t> output: </a:t>
+                </a:r>
+                <a14:m>
+                  <m:oMath xmlns:m="http://schemas.openxmlformats.org/officeDocument/2006/math">
+                    <m:f>
+                      <m:fPr>
+                        <m:ctrlPr>
+                          <a:rPr lang="en-US" altLang="zh-TW" b="0" i="1" smtClean="0">
+                            <a:latin typeface="Cambria Math" panose="02040503050406030204" pitchFamily="18" charset="0"/>
+                          </a:rPr>
+                        </m:ctrlPr>
+                      </m:fPr>
+                      <m:num>
+                        <m:sSup>
+                          <m:sSupPr>
+                            <m:ctrlPr>
+                              <a:rPr lang="en-US" altLang="zh-TW" b="0" i="1" smtClean="0">
+                                <a:latin typeface="Cambria Math" panose="02040503050406030204" pitchFamily="18" charset="0"/>
+                              </a:rPr>
+                            </m:ctrlPr>
+                          </m:sSupPr>
+                          <m:e>
+                            <m:r>
+                              <a:rPr lang="en-US" altLang="zh-TW" b="0" i="1" smtClean="0">
+                                <a:latin typeface="Cambria Math" panose="02040503050406030204" pitchFamily="18" charset="0"/>
+                              </a:rPr>
+                              <m:t>2</m:t>
+                            </m:r>
+                          </m:e>
+                          <m:sup>
+                            <m:r>
+                              <a:rPr lang="en-US" altLang="zh-TW" b="0" i="1" smtClean="0">
+                                <a:latin typeface="Cambria Math" panose="02040503050406030204" pitchFamily="18" charset="0"/>
+                              </a:rPr>
+                              <m:t>𝑚𝑎𝑥</m:t>
+                            </m:r>
+                          </m:sup>
+                        </m:sSup>
+                      </m:num>
+                      <m:den>
+                        <m:nary>
+                          <m:naryPr>
+                            <m:chr m:val="∑"/>
+                            <m:limLoc m:val="subSup"/>
+                            <m:subHide m:val="on"/>
+                            <m:supHide m:val="on"/>
+                            <m:ctrlPr>
+                              <a:rPr lang="en-US" altLang="zh-TW" b="0" i="1" smtClean="0">
+                                <a:latin typeface="Cambria Math" panose="02040503050406030204" pitchFamily="18" charset="0"/>
+                              </a:rPr>
+                            </m:ctrlPr>
+                          </m:naryPr>
+                          <m:sub/>
+                          <m:sup/>
+                          <m:e>
+                            <m:sSup>
+                              <m:sSupPr>
+                                <m:ctrlPr>
+                                  <a:rPr lang="en-US" altLang="zh-TW" b="0" i="1" smtClean="0">
+                                    <a:latin typeface="Cambria Math" panose="02040503050406030204" pitchFamily="18" charset="0"/>
+                                  </a:rPr>
+                                </m:ctrlPr>
+                              </m:sSupPr>
+                              <m:e>
+                                <m:r>
+                                  <a:rPr lang="en-US" altLang="zh-TW" b="0" i="1" smtClean="0">
+                                    <a:latin typeface="Cambria Math" panose="02040503050406030204" pitchFamily="18" charset="0"/>
+                                  </a:rPr>
+                                  <m:t>2</m:t>
+                                </m:r>
+                              </m:e>
+                              <m:sup>
+                                <m:r>
+                                  <a:rPr lang="en-US" altLang="zh-TW" b="0" i="1" smtClean="0">
+                                    <a:latin typeface="Cambria Math" panose="02040503050406030204" pitchFamily="18" charset="0"/>
+                                  </a:rPr>
+                                  <m:t>𝑚𝑎𝑥</m:t>
+                                </m:r>
+                              </m:sup>
+                            </m:sSup>
+                          </m:e>
+                        </m:nary>
+                      </m:den>
+                    </m:f>
+                    <m:r>
+                      <a:rPr lang="en-US" altLang="zh-TW" b="0" i="1" smtClean="0">
+                        <a:latin typeface="Cambria Math" panose="02040503050406030204" pitchFamily="18" charset="0"/>
+                      </a:rPr>
+                      <m:t>×255=</m:t>
+                    </m:r>
+                    <m:f>
+                      <m:fPr>
+                        <m:ctrlPr>
+                          <a:rPr lang="en-US" altLang="zh-TW" b="0" i="1" smtClean="0">
+                            <a:latin typeface="Cambria Math" panose="02040503050406030204" pitchFamily="18" charset="0"/>
+                          </a:rPr>
+                        </m:ctrlPr>
+                      </m:fPr>
+                      <m:num>
+                        <m:r>
+                          <a:rPr lang="en-US" altLang="zh-TW" b="0" i="1" smtClean="0">
+                            <a:latin typeface="Cambria Math" panose="02040503050406030204" pitchFamily="18" charset="0"/>
+                          </a:rPr>
+                          <m:t>255</m:t>
+                        </m:r>
+                      </m:num>
+                      <m:den>
+                        <m:r>
+                          <a:rPr lang="en-US" altLang="zh-TW" b="0" i="1" smtClean="0">
+                            <a:latin typeface="Cambria Math" panose="02040503050406030204" pitchFamily="18" charset="0"/>
+                          </a:rPr>
+                          <m:t>16</m:t>
+                        </m:r>
+                      </m:den>
+                    </m:f>
+                    <m:r>
+                      <a:rPr lang="en-US" altLang="zh-TW" b="0" i="1" smtClean="0">
+                        <a:latin typeface="Cambria Math" panose="02040503050406030204" pitchFamily="18" charset="0"/>
+                      </a:rPr>
+                      <m:t>=15</m:t>
+                    </m:r>
+                  </m:oMath>
+                </a14:m>
+                <a:r>
+                  <a:rPr lang="en-US" altLang="zh-TW" dirty="0"/>
+                  <a:t> </a:t>
+                </a:r>
+              </a:p>
+              <a:p>
+                <a:endParaRPr lang="zh-TW" altLang="en-US" dirty="0"/>
+              </a:p>
+            </p:txBody>
+          </p:sp>
+        </mc:Choice>
+        <mc:Fallback>
+          <p:sp>
+            <p:nvSpPr>
+              <p:cNvPr id="3" name="內容版面配置區 2">
+                <a:extLst>
+                  <a:ext uri="{FF2B5EF4-FFF2-40B4-BE49-F238E27FC236}">
+                    <a16:creationId xmlns:a16="http://schemas.microsoft.com/office/drawing/2014/main" id="{7F4C614D-E7FE-419C-8F98-21873BA85352}"/>
+                  </a:ext>
+                </a:extLst>
+              </p:cNvPr>
+              <p:cNvSpPr>
+                <a:spLocks noGrp="1" noRot="1" noChangeAspect="1" noMove="1" noResize="1" noEditPoints="1" noAdjustHandles="1" noChangeArrowheads="1" noChangeShapeType="1" noTextEdit="1"/>
+              </p:cNvSpPr>
+              <p:nvPr>
+                <p:ph idx="1"/>
+              </p:nvPr>
+            </p:nvSpPr>
+            <p:spPr>
+              <a:xfrm>
+                <a:off x="1371599" y="1620141"/>
+                <a:ext cx="10534011" cy="5069094"/>
+              </a:xfrm>
+              <a:blipFill>
+                <a:blip r:embed="rId2"/>
+                <a:stretch>
+                  <a:fillRect l="-810"/>
+                </a:stretch>
+              </a:blipFill>
+            </p:spPr>
+            <p:txBody>
+              <a:bodyPr/>
+              <a:lstStyle/>
+              <a:p>
+                <a:r>
+                  <a:rPr lang="zh-TW" altLang="en-US">
+                    <a:noFill/>
+                  </a:rPr>
+                  <a:t> </a:t>
+                </a:r>
+              </a:p>
+            </p:txBody>
+          </p:sp>
+        </mc:Fallback>
+      </mc:AlternateContent>
+      <p:sp>
+        <p:nvSpPr>
+          <p:cNvPr id="4" name="日期版面配置區 3">
+            <a:extLst>
+              <a:ext uri="{FF2B5EF4-FFF2-40B4-BE49-F238E27FC236}">
+                <a16:creationId xmlns:a16="http://schemas.microsoft.com/office/drawing/2014/main" id="{159AF3C7-1F38-4208-B828-B2261917AF9D}"/>
+              </a:ext>
+            </a:extLst>
+          </p:cNvPr>
+          <p:cNvSpPr>
+            <a:spLocks noGrp="1"/>
+          </p:cNvSpPr>
+          <p:nvPr>
+            <p:ph type="dt" sz="half" idx="10"/>
+          </p:nvPr>
+        </p:nvSpPr>
+        <p:spPr/>
+        <p:txBody>
+          <a:bodyPr/>
+          <a:lstStyle/>
+          <a:p>
+            <a:fld id="{D12744AA-2124-42E6-AA52-9077A6A76493}" type="datetime1">
+              <a:rPr lang="zh-TW" altLang="en-US" smtClean="0"/>
+              <a:t>2025/5/19</a:t>
+            </a:fld>
+            <a:endParaRPr lang="zh-TW" altLang="en-US"/>
+          </a:p>
+        </p:txBody>
+      </p:sp>
+      <p:sp>
+        <p:nvSpPr>
+          <p:cNvPr id="5" name="投影片編號版面配置區 4">
+            <a:extLst>
+              <a:ext uri="{FF2B5EF4-FFF2-40B4-BE49-F238E27FC236}">
+                <a16:creationId xmlns:a16="http://schemas.microsoft.com/office/drawing/2014/main" id="{650122B4-4ECD-4625-BAFC-6FB6E0AAF4D9}"/>
+              </a:ext>
+            </a:extLst>
+          </p:cNvPr>
+          <p:cNvSpPr>
+            <a:spLocks noGrp="1"/>
+          </p:cNvSpPr>
+          <p:nvPr>
+            <p:ph type="sldNum" sz="quarter" idx="12"/>
+          </p:nvPr>
+        </p:nvSpPr>
+        <p:spPr/>
+        <p:txBody>
+          <a:bodyPr/>
+          <a:lstStyle/>
+          <a:p>
+            <a:fld id="{13D67497-B2F6-4681-B86D-28F94DA14DA8}" type="slidenum">
+              <a:rPr lang="zh-TW" altLang="en-US" smtClean="0"/>
+              <a:t>12</a:t>
+            </a:fld>
+            <a:endParaRPr lang="zh-TW" altLang="en-US"/>
+          </a:p>
+        </p:txBody>
+      </p:sp>
+    </p:spTree>
+    <p:extLst>
+      <p:ext uri="{BB962C8B-B14F-4D97-AF65-F5344CB8AC3E}">
+        <p14:creationId xmlns:p14="http://schemas.microsoft.com/office/powerpoint/2010/main" val="2517443299"/>
+      </p:ext>
+    </p:extLst>
+  </p:cSld>
+  <p:clrMapOvr>
+    <a:masterClrMapping/>
+  </p:clrMapOvr>
+</p:sld>
+</file>
+
+<file path=ppt/slides/slide13.xml><?xml version="1.0" encoding="utf-8"?>
+<p:sld xmlns:a="http://schemas.openxmlformats.org/drawingml/2006/main" xmlns:r="http://schemas.openxmlformats.org/officeDocument/2006/relationships" xmlns:p="http://schemas.openxmlformats.org/presentationml/2006/main">
+  <p:cSld>
+    <p:spTree>
+      <p:nvGrpSpPr>
+        <p:cNvPr id="1" name=""/>
+        <p:cNvGrpSpPr/>
+        <p:nvPr/>
+      </p:nvGrpSpPr>
+      <p:grpSpPr>
+        <a:xfrm>
+          <a:off x="0" y="0"/>
+          <a:ext cx="0" cy="0"/>
+          <a:chOff x="0" y="0"/>
+          <a:chExt cx="0" cy="0"/>
+        </a:xfrm>
+      </p:grpSpPr>
+      <mc:AlternateContent xmlns:mc="http://schemas.openxmlformats.org/markup-compatibility/2006">
+        <mc:Choice xmlns:a14="http://schemas.microsoft.com/office/drawing/2010/main" Requires="a14">
+          <p:sp>
+            <p:nvSpPr>
+              <p:cNvPr id="3" name="內容版面配置區 2">
+                <a:extLst>
+                  <a:ext uri="{FF2B5EF4-FFF2-40B4-BE49-F238E27FC236}">
+                    <a16:creationId xmlns:a16="http://schemas.microsoft.com/office/drawing/2014/main" id="{7F4C614D-E7FE-419C-8F98-21873BA85352}"/>
+                  </a:ext>
+                </a:extLst>
+              </p:cNvPr>
+              <p:cNvSpPr>
+                <a:spLocks noGrp="1"/>
+              </p:cNvSpPr>
+              <p:nvPr>
+                <p:ph idx="1"/>
+              </p:nvPr>
+            </p:nvSpPr>
+            <p:spPr>
+              <a:xfrm>
+                <a:off x="1371599" y="1620141"/>
+                <a:ext cx="10534011" cy="5069094"/>
+              </a:xfrm>
+            </p:spPr>
+            <p:txBody>
+              <a:bodyPr>
+                <a:normAutofit/>
+              </a:bodyPr>
+              <a:lstStyle/>
+              <a:p>
+                <a:r>
+                  <a:rPr lang="en-US" altLang="zh-TW" dirty="0"/>
+                  <a:t>scaled sum: </a:t>
+                </a:r>
+                <a14:m>
+                  <m:oMath xmlns:m="http://schemas.openxmlformats.org/officeDocument/2006/math">
+                    <m:r>
+                      <a:rPr lang="en-US" altLang="zh-TW" i="1" dirty="0" smtClean="0">
+                        <a:latin typeface="Cambria Math" panose="02040503050406030204" pitchFamily="18" charset="0"/>
+                      </a:rPr>
+                      <m:t>15008</m:t>
+                    </m:r>
+                    <m:r>
+                      <a:rPr lang="en-US" altLang="zh-TW" b="0" i="1" dirty="0" smtClean="0">
+                        <a:latin typeface="Cambria Math" panose="02040503050406030204" pitchFamily="18" charset="0"/>
+                      </a:rPr>
+                      <m:t>×</m:t>
+                    </m:r>
+                    <m:r>
+                      <a:rPr lang="en-US" altLang="zh-TW" i="1" dirty="0" smtClean="0">
+                        <a:latin typeface="Cambria Math" panose="02040503050406030204" pitchFamily="18" charset="0"/>
+                      </a:rPr>
+                      <m:t>0</m:t>
+                    </m:r>
+                    <m:r>
+                      <a:rPr lang="en-US" altLang="zh-TW" i="1" dirty="0" smtClean="0">
+                        <a:latin typeface="Cambria Math" panose="02040503050406030204" pitchFamily="18" charset="0"/>
+                      </a:rPr>
+                      <m:t>𝑥</m:t>
+                    </m:r>
+                    <m:r>
+                      <a:rPr lang="en-US" altLang="zh-TW" i="1" dirty="0" smtClean="0">
+                        <a:latin typeface="Cambria Math" panose="02040503050406030204" pitchFamily="18" charset="0"/>
+                      </a:rPr>
+                      <m:t>65× 0</m:t>
+                    </m:r>
+                    <m:r>
+                      <a:rPr lang="en-US" altLang="zh-TW" i="1" dirty="0" smtClean="0">
+                        <a:latin typeface="Cambria Math" panose="02040503050406030204" pitchFamily="18" charset="0"/>
+                      </a:rPr>
+                      <m:t>𝑥</m:t>
+                    </m:r>
+                    <m:r>
+                      <a:rPr lang="en-US" altLang="zh-TW" i="1" dirty="0" smtClean="0">
+                        <a:latin typeface="Cambria Math" panose="02040503050406030204" pitchFamily="18" charset="0"/>
+                      </a:rPr>
+                      <m:t>65÷ </m:t>
+                    </m:r>
+                    <m:sSup>
+                      <m:sSupPr>
+                        <m:ctrlPr>
+                          <a:rPr lang="en-US" altLang="zh-TW" i="1" dirty="0" smtClean="0">
+                            <a:latin typeface="Cambria Math" panose="02040503050406030204" pitchFamily="18" charset="0"/>
+                          </a:rPr>
+                        </m:ctrlPr>
+                      </m:sSupPr>
+                      <m:e>
+                        <m:r>
+                          <a:rPr lang="en-US" altLang="zh-TW" i="1" dirty="0" smtClean="0">
+                            <a:latin typeface="Cambria Math" panose="02040503050406030204" pitchFamily="18" charset="0"/>
+                          </a:rPr>
+                          <m:t>2</m:t>
+                        </m:r>
+                      </m:e>
+                      <m:sup>
+                        <m:r>
+                          <a:rPr lang="en-US" altLang="zh-TW" i="1" dirty="0" smtClean="0">
+                            <a:latin typeface="Cambria Math" panose="02040503050406030204" pitchFamily="18" charset="0"/>
+                          </a:rPr>
+                          <m:t>16</m:t>
+                        </m:r>
+                      </m:sup>
+                    </m:sSup>
+                    <m:r>
+                      <a:rPr lang="en-US" altLang="zh-TW" i="1" dirty="0" smtClean="0">
+                        <a:latin typeface="Cambria Math" panose="02040503050406030204" pitchFamily="18" charset="0"/>
+                      </a:rPr>
+                      <m:t> </m:t>
+                    </m:r>
+                  </m:oMath>
+                </a14:m>
+                <a:r>
+                  <a:rPr lang="en-US" altLang="zh-TW" dirty="0"/>
+                  <a:t>in Q8.8 = 40581632 and</a:t>
+                </a:r>
+              </a:p>
+              <a:p>
+                <a:pPr marL="0" indent="0">
+                  <a:buNone/>
+                </a:pPr>
+                <a:r>
+                  <a:rPr lang="en-US" altLang="zh-TW" dirty="0"/>
+                  <a:t>                         </a:t>
+                </a:r>
+                <a14:m>
+                  <m:oMath xmlns:m="http://schemas.openxmlformats.org/officeDocument/2006/math">
+                    <m:r>
+                      <a:rPr lang="en-US" altLang="zh-TW" i="1" dirty="0" smtClean="0">
+                        <a:latin typeface="Cambria Math" panose="02040503050406030204" pitchFamily="18" charset="0"/>
+                      </a:rPr>
+                      <m:t>1</m:t>
+                    </m:r>
+                    <m:r>
+                      <a:rPr lang="en-US" altLang="zh-TW" b="0" i="1" dirty="0" smtClean="0">
+                        <a:latin typeface="Cambria Math" panose="02040503050406030204" pitchFamily="18" charset="0"/>
+                      </a:rPr>
+                      <m:t>29794</m:t>
+                    </m:r>
+                    <m:r>
+                      <a:rPr lang="en-US" altLang="zh-TW" b="0" i="1" dirty="0" smtClean="0">
+                        <a:latin typeface="Cambria Math" panose="02040503050406030204" pitchFamily="18" charset="0"/>
+                      </a:rPr>
+                      <m:t>×</m:t>
+                    </m:r>
+                    <m:r>
+                      <a:rPr lang="en-US" altLang="zh-TW" i="1" dirty="0" smtClean="0">
+                        <a:latin typeface="Cambria Math" panose="02040503050406030204" pitchFamily="18" charset="0"/>
+                      </a:rPr>
+                      <m:t>0</m:t>
+                    </m:r>
+                    <m:r>
+                      <a:rPr lang="en-US" altLang="zh-TW" i="1" dirty="0" smtClean="0">
+                        <a:latin typeface="Cambria Math" panose="02040503050406030204" pitchFamily="18" charset="0"/>
+                      </a:rPr>
+                      <m:t>𝑥</m:t>
+                    </m:r>
+                    <m:r>
+                      <a:rPr lang="en-US" altLang="zh-TW" i="1" dirty="0" smtClean="0">
+                        <a:latin typeface="Cambria Math" panose="02040503050406030204" pitchFamily="18" charset="0"/>
+                      </a:rPr>
+                      <m:t>65× 0</m:t>
+                    </m:r>
+                    <m:r>
+                      <a:rPr lang="en-US" altLang="zh-TW" i="1" dirty="0" smtClean="0">
+                        <a:latin typeface="Cambria Math" panose="02040503050406030204" pitchFamily="18" charset="0"/>
+                      </a:rPr>
+                      <m:t>𝑥</m:t>
+                    </m:r>
+                    <m:r>
+                      <a:rPr lang="en-US" altLang="zh-TW" i="1" dirty="0" smtClean="0">
+                        <a:latin typeface="Cambria Math" panose="02040503050406030204" pitchFamily="18" charset="0"/>
+                      </a:rPr>
+                      <m:t>65÷ </m:t>
+                    </m:r>
+                    <m:sSup>
+                      <m:sSupPr>
+                        <m:ctrlPr>
+                          <a:rPr lang="en-US" altLang="zh-TW" i="1" dirty="0" smtClean="0">
+                            <a:latin typeface="Cambria Math" panose="02040503050406030204" pitchFamily="18" charset="0"/>
+                          </a:rPr>
+                        </m:ctrlPr>
+                      </m:sSupPr>
+                      <m:e>
+                        <m:r>
+                          <a:rPr lang="en-US" altLang="zh-TW" i="1" dirty="0" smtClean="0">
+                            <a:latin typeface="Cambria Math" panose="02040503050406030204" pitchFamily="18" charset="0"/>
+                          </a:rPr>
+                          <m:t>2</m:t>
+                        </m:r>
+                      </m:e>
+                      <m:sup>
+                        <m:r>
+                          <a:rPr lang="en-US" altLang="zh-TW" i="1" dirty="0" smtClean="0">
+                            <a:latin typeface="Cambria Math" panose="02040503050406030204" pitchFamily="18" charset="0"/>
+                          </a:rPr>
+                          <m:t>16</m:t>
+                        </m:r>
+                      </m:sup>
+                    </m:sSup>
+                    <m:r>
+                      <a:rPr lang="en-US" altLang="zh-TW" i="1" dirty="0" smtClean="0">
+                        <a:latin typeface="Cambria Math" panose="02040503050406030204" pitchFamily="18" charset="0"/>
+                      </a:rPr>
+                      <m:t> </m:t>
+                    </m:r>
+                  </m:oMath>
+                </a14:m>
+                <a:r>
+                  <a:rPr lang="en-US" altLang="zh-TW" dirty="0"/>
+                  <a:t>in Q8.8 = 350962976</a:t>
+                </a:r>
+              </a:p>
+              <a:p>
+                <a:r>
+                  <a:rPr lang="en-US" altLang="zh-TW" dirty="0"/>
+                  <a:t>Truncated value: 2 and 20 (high 16 bits)</a:t>
+                </a:r>
+              </a:p>
+              <a:p>
+                <a:r>
+                  <a:rPr lang="en-US" altLang="zh-TW" dirty="0"/>
+                  <a:t>Max value: 20</a:t>
+                </a:r>
+              </a:p>
+              <a:p>
+                <a:endParaRPr lang="zh-TW" altLang="en-US" dirty="0"/>
+              </a:p>
+            </p:txBody>
+          </p:sp>
+        </mc:Choice>
+        <mc:Fallback>
+          <p:sp>
+            <p:nvSpPr>
+              <p:cNvPr id="3" name="內容版面配置區 2">
+                <a:extLst>
+                  <a:ext uri="{FF2B5EF4-FFF2-40B4-BE49-F238E27FC236}">
+                    <a16:creationId xmlns:a16="http://schemas.microsoft.com/office/drawing/2014/main" id="{7F4C614D-E7FE-419C-8F98-21873BA85352}"/>
+                  </a:ext>
+                </a:extLst>
+              </p:cNvPr>
+              <p:cNvSpPr>
+                <a:spLocks noGrp="1" noRot="1" noChangeAspect="1" noMove="1" noResize="1" noEditPoints="1" noAdjustHandles="1" noChangeArrowheads="1" noChangeShapeType="1" noTextEdit="1"/>
+              </p:cNvSpPr>
+              <p:nvPr>
+                <p:ph idx="1"/>
+              </p:nvPr>
+            </p:nvSpPr>
+            <p:spPr>
+              <a:xfrm>
+                <a:off x="1371599" y="1620141"/>
+                <a:ext cx="10534011" cy="5069094"/>
+              </a:xfrm>
+              <a:blipFill>
+                <a:blip r:embed="rId2"/>
+                <a:stretch>
+                  <a:fillRect l="-810"/>
+                </a:stretch>
+              </a:blipFill>
+            </p:spPr>
+            <p:txBody>
+              <a:bodyPr/>
+              <a:lstStyle/>
+              <a:p>
+                <a:r>
+                  <a:rPr lang="zh-TW" altLang="en-US">
+                    <a:noFill/>
+                  </a:rPr>
+                  <a:t> </a:t>
+                </a:r>
+              </a:p>
+            </p:txBody>
+          </p:sp>
+        </mc:Fallback>
+      </mc:AlternateContent>
+      <p:sp>
+        <p:nvSpPr>
+          <p:cNvPr id="4" name="日期版面配置區 3">
+            <a:extLst>
+              <a:ext uri="{FF2B5EF4-FFF2-40B4-BE49-F238E27FC236}">
+                <a16:creationId xmlns:a16="http://schemas.microsoft.com/office/drawing/2014/main" id="{159AF3C7-1F38-4208-B828-B2261917AF9D}"/>
+              </a:ext>
+            </a:extLst>
+          </p:cNvPr>
+          <p:cNvSpPr>
+            <a:spLocks noGrp="1"/>
+          </p:cNvSpPr>
+          <p:nvPr>
+            <p:ph type="dt" sz="half" idx="10"/>
+          </p:nvPr>
+        </p:nvSpPr>
+        <p:spPr/>
+        <p:txBody>
+          <a:bodyPr/>
+          <a:lstStyle/>
+          <a:p>
+            <a:fld id="{D12744AA-2124-42E6-AA52-9077A6A76493}" type="datetime1">
+              <a:rPr lang="zh-TW" altLang="en-US" smtClean="0"/>
+              <a:t>2025/5/19</a:t>
+            </a:fld>
+            <a:endParaRPr lang="zh-TW" altLang="en-US"/>
+          </a:p>
+        </p:txBody>
+      </p:sp>
+      <p:sp>
+        <p:nvSpPr>
+          <p:cNvPr id="5" name="投影片編號版面配置區 4">
+            <a:extLst>
+              <a:ext uri="{FF2B5EF4-FFF2-40B4-BE49-F238E27FC236}">
+                <a16:creationId xmlns:a16="http://schemas.microsoft.com/office/drawing/2014/main" id="{650122B4-4ECD-4625-BAFC-6FB6E0AAF4D9}"/>
+              </a:ext>
+            </a:extLst>
+          </p:cNvPr>
+          <p:cNvSpPr>
+            <a:spLocks noGrp="1"/>
+          </p:cNvSpPr>
+          <p:nvPr>
+            <p:ph type="sldNum" sz="quarter" idx="12"/>
+          </p:nvPr>
+        </p:nvSpPr>
+        <p:spPr/>
+        <p:txBody>
+          <a:bodyPr/>
+          <a:lstStyle/>
+          <a:p>
+            <a:fld id="{13D67497-B2F6-4681-B86D-28F94DA14DA8}" type="slidenum">
+              <a:rPr lang="zh-TW" altLang="en-US" smtClean="0"/>
+              <a:t>13</a:t>
+            </a:fld>
+            <a:endParaRPr lang="zh-TW" altLang="en-US"/>
+          </a:p>
+        </p:txBody>
+      </p:sp>
+      <p:pic>
+        <p:nvPicPr>
+          <p:cNvPr id="6" name="圖片 5">
+            <a:extLst>
+              <a:ext uri="{FF2B5EF4-FFF2-40B4-BE49-F238E27FC236}">
+                <a16:creationId xmlns:a16="http://schemas.microsoft.com/office/drawing/2014/main" id="{C636EA21-34E5-439F-984E-8B530655B477}"/>
+              </a:ext>
+            </a:extLst>
+          </p:cNvPr>
+          <p:cNvPicPr>
+            <a:picLocks noChangeAspect="1"/>
+          </p:cNvPicPr>
+          <p:nvPr/>
+        </p:nvPicPr>
+        <p:blipFill>
+          <a:blip r:embed="rId3"/>
+          <a:stretch>
+            <a:fillRect/>
+          </a:stretch>
+        </p:blipFill>
+        <p:spPr>
+          <a:xfrm>
+            <a:off x="4350140" y="4491813"/>
+            <a:ext cx="6839094" cy="1362802"/>
           </a:xfrm>
           <a:prstGeom prst="rect">
             <a:avLst/>
           </a:prstGeom>
         </p:spPr>
-        <p:txBody>
-          <a:bodyPr vert="horz" lIns="91440" tIns="45720" rIns="91440" bIns="45720" rtlCol="0">
-            <a:normAutofit/>
-          </a:bodyPr>
-          <a:lstStyle>
-            <a:lvl1pPr marL="384048" indent="-384048" algn="l" defTabSz="914400" rtl="0" eaLnBrk="1" latinLnBrk="0" hangingPunct="1">
-              <a:lnSpc>
-                <a:spcPct val="150000"/>
-              </a:lnSpc>
-              <a:spcBef>
-                <a:spcPts val="1000"/>
-              </a:spcBef>
-              <a:spcAft>
-                <a:spcPts val="200"/>
-              </a:spcAft>
-              <a:buFont typeface="Franklin Gothic Book" panose="020B0503020102020204" pitchFamily="34" charset="0"/>
-              <a:buChar char="■"/>
-              <a:defRPr sz="2400" kern="1200" baseline="0">
-                <a:solidFill>
-                  <a:schemeClr val="tx2"/>
-                </a:solidFill>
-                <a:latin typeface="Times New Roman" panose="02020603050405020304" pitchFamily="18" charset="0"/>
-                <a:ea typeface="標楷體" panose="03000509000000000000" pitchFamily="65" charset="-120"/>
-                <a:cs typeface="Times New Roman" panose="02020603050405020304" pitchFamily="18" charset="0"/>
-              </a:defRPr>
-            </a:lvl1pPr>
-            <a:lvl2pPr marL="914400" indent="-384048" algn="l" defTabSz="914400" rtl="0" eaLnBrk="1" latinLnBrk="0" hangingPunct="1">
-              <a:lnSpc>
-                <a:spcPct val="150000"/>
-              </a:lnSpc>
-              <a:spcBef>
-                <a:spcPts val="500"/>
-              </a:spcBef>
-              <a:spcAft>
-                <a:spcPts val="200"/>
-              </a:spcAft>
-              <a:buFont typeface="Franklin Gothic Book" panose="020B0503020102020204" pitchFamily="34" charset="0"/>
-              <a:buChar char="–"/>
-              <a:defRPr sz="2400" i="1" kern="1200" baseline="0">
-                <a:solidFill>
-                  <a:schemeClr val="tx2"/>
-                </a:solidFill>
-                <a:latin typeface="Times New Roman" panose="02020603050405020304" pitchFamily="18" charset="0"/>
-                <a:ea typeface="標楷體" panose="03000509000000000000" pitchFamily="65" charset="-120"/>
-                <a:cs typeface="Times New Roman" panose="02020603050405020304" pitchFamily="18" charset="0"/>
-              </a:defRPr>
-            </a:lvl2pPr>
-            <a:lvl3pPr marL="1371600" indent="-384048" algn="l" defTabSz="914400" rtl="0" eaLnBrk="1" latinLnBrk="0" hangingPunct="1">
-              <a:lnSpc>
-                <a:spcPct val="150000"/>
-              </a:lnSpc>
-              <a:spcBef>
-                <a:spcPts val="500"/>
-              </a:spcBef>
-              <a:spcAft>
-                <a:spcPts val="200"/>
-              </a:spcAft>
-              <a:buFont typeface="Franklin Gothic Book" panose="020B0503020102020204" pitchFamily="34" charset="0"/>
-              <a:buChar char="■"/>
-              <a:defRPr sz="2000" kern="1200" baseline="0">
-                <a:solidFill>
-                  <a:schemeClr val="tx2"/>
-                </a:solidFill>
-                <a:latin typeface="Times New Roman" panose="02020603050405020304" pitchFamily="18" charset="0"/>
-                <a:ea typeface="標楷體" panose="03000509000000000000" pitchFamily="65" charset="-120"/>
-                <a:cs typeface="Times New Roman" panose="02020603050405020304" pitchFamily="18" charset="0"/>
-              </a:defRPr>
-            </a:lvl3pPr>
-            <a:lvl4pPr marL="1828800" indent="-384048" algn="l" defTabSz="914400" rtl="0" eaLnBrk="1" latinLnBrk="0" hangingPunct="1">
-              <a:lnSpc>
-                <a:spcPct val="150000"/>
-              </a:lnSpc>
-              <a:spcBef>
-                <a:spcPts val="500"/>
-              </a:spcBef>
-              <a:spcAft>
-                <a:spcPts val="200"/>
-              </a:spcAft>
-              <a:buFont typeface="Franklin Gothic Book" panose="020B0503020102020204" pitchFamily="34" charset="0"/>
-              <a:buChar char="–"/>
-              <a:defRPr sz="2000" i="1" kern="1200" baseline="0">
-                <a:solidFill>
-                  <a:schemeClr val="tx2"/>
-                </a:solidFill>
-                <a:latin typeface="Times New Roman" panose="02020603050405020304" pitchFamily="18" charset="0"/>
-                <a:ea typeface="標楷體" panose="03000509000000000000" pitchFamily="65" charset="-120"/>
-                <a:cs typeface="Times New Roman" panose="02020603050405020304" pitchFamily="18" charset="0"/>
-              </a:defRPr>
-            </a:lvl4pPr>
-            <a:lvl5pPr marL="2286000" indent="-384048" algn="l" defTabSz="914400" rtl="0" eaLnBrk="1" latinLnBrk="0" hangingPunct="1">
-              <a:lnSpc>
-                <a:spcPct val="150000"/>
-              </a:lnSpc>
-              <a:spcBef>
-                <a:spcPts val="500"/>
-              </a:spcBef>
-              <a:spcAft>
-                <a:spcPts val="200"/>
-              </a:spcAft>
-              <a:buFont typeface="Franklin Gothic Book" panose="020B0503020102020204" pitchFamily="34" charset="0"/>
-              <a:buChar char="■"/>
-              <a:defRPr sz="1800" kern="1200" baseline="0">
-                <a:solidFill>
-                  <a:schemeClr val="tx2"/>
-                </a:solidFill>
-                <a:latin typeface="Times New Roman" panose="02020603050405020304" pitchFamily="18" charset="0"/>
-                <a:ea typeface="標楷體" panose="03000509000000000000" pitchFamily="65" charset="-120"/>
-                <a:cs typeface="Times New Roman" panose="02020603050405020304" pitchFamily="18" charset="0"/>
-              </a:defRPr>
-            </a:lvl5pPr>
-            <a:lvl6pPr marL="2743200" indent="-384048" algn="l" defTabSz="914400" rtl="0" eaLnBrk="1" latinLnBrk="0" hangingPunct="1">
-              <a:lnSpc>
-                <a:spcPct val="94000"/>
-              </a:lnSpc>
-              <a:spcBef>
-                <a:spcPts val="500"/>
-              </a:spcBef>
-              <a:spcAft>
-                <a:spcPts val="200"/>
-              </a:spcAft>
-              <a:buFont typeface="Franklin Gothic Book" panose="020B0503020102020204" pitchFamily="34" charset="0"/>
-              <a:buChar char="–"/>
-              <a:defRPr sz="1600" i="1" kern="1200" baseline="0">
-                <a:solidFill>
-                  <a:schemeClr val="tx2"/>
-                </a:solidFill>
-                <a:latin typeface="+mn-lt"/>
-                <a:ea typeface="+mn-ea"/>
-                <a:cs typeface="+mn-cs"/>
-              </a:defRPr>
-            </a:lvl6pPr>
-            <a:lvl7pPr marL="3200400" indent="-384048" algn="l" defTabSz="914400" rtl="0" eaLnBrk="1" latinLnBrk="0" hangingPunct="1">
-              <a:lnSpc>
-                <a:spcPct val="94000"/>
-              </a:lnSpc>
-              <a:spcBef>
-                <a:spcPts val="500"/>
-              </a:spcBef>
-              <a:spcAft>
-                <a:spcPts val="200"/>
-              </a:spcAft>
-              <a:buFont typeface="Franklin Gothic Book" panose="020B0503020102020204" pitchFamily="34" charset="0"/>
-              <a:buChar char="■"/>
-              <a:defRPr sz="1400" kern="1200" baseline="0">
-                <a:solidFill>
-                  <a:schemeClr val="tx2"/>
-                </a:solidFill>
-                <a:latin typeface="+mn-lt"/>
-                <a:ea typeface="+mn-ea"/>
-                <a:cs typeface="+mn-cs"/>
-              </a:defRPr>
-            </a:lvl7pPr>
-            <a:lvl8pPr marL="3657600" indent="-384048" algn="l" defTabSz="914400" rtl="0" eaLnBrk="1" latinLnBrk="0" hangingPunct="1">
-              <a:lnSpc>
-                <a:spcPct val="94000"/>
-              </a:lnSpc>
-              <a:spcBef>
-                <a:spcPts val="500"/>
-              </a:spcBef>
-              <a:spcAft>
-                <a:spcPts val="200"/>
-              </a:spcAft>
-              <a:buFont typeface="Franklin Gothic Book" panose="020B0503020102020204" pitchFamily="34" charset="0"/>
-              <a:buChar char="–"/>
-              <a:defRPr sz="1400" i="1" kern="1200" baseline="0">
-                <a:solidFill>
-                  <a:schemeClr val="tx2"/>
-                </a:solidFill>
-                <a:latin typeface="+mn-lt"/>
-                <a:ea typeface="+mn-ea"/>
-                <a:cs typeface="+mn-cs"/>
-              </a:defRPr>
-            </a:lvl8pPr>
-            <a:lvl9pPr marL="4114800" indent="-384048" algn="l" defTabSz="914400" rtl="0" eaLnBrk="1" latinLnBrk="0" hangingPunct="1">
-              <a:lnSpc>
-                <a:spcPct val="94000"/>
-              </a:lnSpc>
-              <a:spcBef>
-                <a:spcPts val="500"/>
-              </a:spcBef>
-              <a:spcAft>
-                <a:spcPts val="200"/>
-              </a:spcAft>
-              <a:buFont typeface="Franklin Gothic Book" panose="020B0503020102020204" pitchFamily="34" charset="0"/>
-              <a:buChar char="■"/>
-              <a:defRPr sz="1400" kern="1200" baseline="0">
-                <a:solidFill>
-                  <a:schemeClr val="tx2"/>
-                </a:solidFill>
-                <a:latin typeface="+mn-lt"/>
-                <a:ea typeface="+mn-ea"/>
-                <a:cs typeface="+mn-cs"/>
-              </a:defRPr>
-            </a:lvl9pPr>
-          </a:lstStyle>
+      </p:pic>
+      <p:sp>
+        <p:nvSpPr>
+          <p:cNvPr id="10" name="標題 1">
+            <a:extLst>
+              <a:ext uri="{FF2B5EF4-FFF2-40B4-BE49-F238E27FC236}">
+                <a16:creationId xmlns:a16="http://schemas.microsoft.com/office/drawing/2014/main" id="{B10941EA-44C4-47C2-ABA3-64B00329F693}"/>
+              </a:ext>
+            </a:extLst>
+          </p:cNvPr>
+          <p:cNvSpPr>
+            <a:spLocks noGrp="1"/>
+          </p:cNvSpPr>
+          <p:nvPr>
+            <p:ph type="title"/>
+          </p:nvPr>
+        </p:nvSpPr>
+        <p:spPr>
+          <a:xfrm>
+            <a:off x="1371600" y="685800"/>
+            <a:ext cx="9601200" cy="879113"/>
+          </a:xfrm>
+        </p:spPr>
+        <p:txBody>
+          <a:bodyPr/>
+          <a:lstStyle/>
           <a:p>
             <a:r>
               <a:rPr lang="en-US" altLang="zh-TW" dirty="0"/>
-              <a:t>The Verilog code output is</a:t>
+              <a:t>Comparing Output of PPU</a:t>
             </a:r>
             <a:endParaRPr lang="zh-TW" altLang="en-US" dirty="0"/>
+          </a:p>
+        </p:txBody>
+      </p:sp>
+    </p:spTree>
+    <p:extLst>
+      <p:ext uri="{BB962C8B-B14F-4D97-AF65-F5344CB8AC3E}">
+        <p14:creationId xmlns:p14="http://schemas.microsoft.com/office/powerpoint/2010/main" val="3844067908"/>
+      </p:ext>
+    </p:extLst>
+  </p:cSld>
+  <p:clrMapOvr>
+    <a:masterClrMapping/>
+  </p:clrMapOvr>
+</p:sld>
+</file>
+
+<file path=ppt/slides/slide14.xml><?xml version="1.0" encoding="utf-8"?>
+<p:sld xmlns:a="http://schemas.openxmlformats.org/drawingml/2006/main" xmlns:r="http://schemas.openxmlformats.org/officeDocument/2006/relationships" xmlns:p="http://schemas.openxmlformats.org/presentationml/2006/main">
+  <p:cSld>
+    <p:spTree>
+      <p:nvGrpSpPr>
+        <p:cNvPr id="1" name=""/>
+        <p:cNvGrpSpPr/>
+        <p:nvPr/>
+      </p:nvGrpSpPr>
+      <p:grpSpPr>
+        <a:xfrm>
+          <a:off x="0" y="0"/>
+          <a:ext cx="0" cy="0"/>
+          <a:chOff x="0" y="0"/>
+          <a:chExt cx="0" cy="0"/>
+        </a:xfrm>
+      </p:grpSpPr>
+      <mc:AlternateContent xmlns:mc="http://schemas.openxmlformats.org/markup-compatibility/2006">
+        <mc:Choice xmlns:a14="http://schemas.microsoft.com/office/drawing/2010/main" Requires="a14">
+          <p:sp>
+            <p:nvSpPr>
+              <p:cNvPr id="3" name="內容版面配置區 2">
+                <a:extLst>
+                  <a:ext uri="{FF2B5EF4-FFF2-40B4-BE49-F238E27FC236}">
+                    <a16:creationId xmlns:a16="http://schemas.microsoft.com/office/drawing/2014/main" id="{7F4C614D-E7FE-419C-8F98-21873BA85352}"/>
+                  </a:ext>
+                </a:extLst>
+              </p:cNvPr>
+              <p:cNvSpPr>
+                <a:spLocks noGrp="1"/>
+              </p:cNvSpPr>
+              <p:nvPr>
+                <p:ph idx="1"/>
+              </p:nvPr>
+            </p:nvSpPr>
+            <p:spPr>
+              <a:xfrm>
+                <a:off x="1371599" y="1620141"/>
+                <a:ext cx="10534011" cy="1808859"/>
+              </a:xfrm>
+            </p:spPr>
+            <p:txBody>
+              <a:bodyPr>
+                <a:normAutofit fontScale="92500" lnSpcReduction="10000"/>
+              </a:bodyPr>
+              <a:lstStyle/>
+              <a:p>
+                <a:r>
+                  <a:rPr lang="en-US" altLang="zh-TW" dirty="0"/>
+                  <a:t>Quantized data:  </a:t>
+                </a:r>
+                <a14:m>
+                  <m:oMath xmlns:m="http://schemas.openxmlformats.org/officeDocument/2006/math">
+                    <m:r>
+                      <a:rPr lang="en-US" altLang="zh-TW" i="1" dirty="0" smtClean="0">
+                        <a:latin typeface="Cambria Math" panose="02040503050406030204" pitchFamily="18" charset="0"/>
+                      </a:rPr>
+                      <m:t>2</m:t>
+                    </m:r>
+                    <m:r>
+                      <a:rPr lang="en-US" altLang="zh-TW" b="0" i="1" dirty="0" smtClean="0">
+                        <a:latin typeface="Cambria Math" panose="02040503050406030204" pitchFamily="18" charset="0"/>
+                      </a:rPr>
+                      <m:t>×</m:t>
+                    </m:r>
+                    <m:f>
+                      <m:fPr>
+                        <m:ctrlPr>
+                          <a:rPr lang="en-US" altLang="zh-TW" i="1" dirty="0" smtClean="0">
+                            <a:latin typeface="Cambria Math" panose="02040503050406030204" pitchFamily="18" charset="0"/>
+                          </a:rPr>
+                        </m:ctrlPr>
+                      </m:fPr>
+                      <m:num>
+                        <m:r>
+                          <a:rPr lang="en-US" altLang="zh-TW" b="0" i="1" dirty="0" smtClean="0">
+                            <a:latin typeface="Cambria Math" panose="02040503050406030204" pitchFamily="18" charset="0"/>
+                          </a:rPr>
+                          <m:t>255</m:t>
+                        </m:r>
+                      </m:num>
+                      <m:den>
+                        <m:r>
+                          <a:rPr lang="en-US" altLang="zh-TW" b="0" i="1" dirty="0" smtClean="0">
+                            <a:latin typeface="Cambria Math" panose="02040503050406030204" pitchFamily="18" charset="0"/>
+                          </a:rPr>
+                          <m:t>20</m:t>
+                        </m:r>
+                      </m:den>
+                    </m:f>
+                    <m:r>
+                      <a:rPr lang="en-US" altLang="zh-TW" b="0" i="0" dirty="0" smtClean="0">
+                        <a:latin typeface="Cambria Math" panose="02040503050406030204" pitchFamily="18" charset="0"/>
+                      </a:rPr>
+                      <m:t>=25</m:t>
+                    </m:r>
+                  </m:oMath>
+                </a14:m>
+                <a:r>
+                  <a:rPr lang="en-US" altLang="zh-TW" dirty="0"/>
+                  <a:t>  and </a:t>
+                </a:r>
+                <a14:m>
+                  <m:oMath xmlns:m="http://schemas.openxmlformats.org/officeDocument/2006/math">
+                    <m:r>
+                      <a:rPr lang="en-US" altLang="zh-TW" i="1" dirty="0">
+                        <a:latin typeface="Cambria Math" panose="02040503050406030204" pitchFamily="18" charset="0"/>
+                      </a:rPr>
+                      <m:t>2</m:t>
+                    </m:r>
+                    <m:r>
+                      <a:rPr lang="en-US" altLang="zh-TW" b="0" i="1" dirty="0" smtClean="0">
+                        <a:latin typeface="Cambria Math" panose="02040503050406030204" pitchFamily="18" charset="0"/>
+                      </a:rPr>
+                      <m:t>0</m:t>
+                    </m:r>
+                    <m:r>
+                      <a:rPr lang="en-US" altLang="zh-TW" i="1" dirty="0">
+                        <a:latin typeface="Cambria Math" panose="02040503050406030204" pitchFamily="18" charset="0"/>
+                      </a:rPr>
+                      <m:t>×</m:t>
+                    </m:r>
+                    <m:f>
+                      <m:fPr>
+                        <m:ctrlPr>
+                          <a:rPr lang="en-US" altLang="zh-TW" i="1" dirty="0">
+                            <a:latin typeface="Cambria Math" panose="02040503050406030204" pitchFamily="18" charset="0"/>
+                          </a:rPr>
+                        </m:ctrlPr>
+                      </m:fPr>
+                      <m:num>
+                        <m:r>
+                          <a:rPr lang="en-US" altLang="zh-TW" i="1" dirty="0">
+                            <a:latin typeface="Cambria Math" panose="02040503050406030204" pitchFamily="18" charset="0"/>
+                          </a:rPr>
+                          <m:t>255</m:t>
+                        </m:r>
+                      </m:num>
+                      <m:den>
+                        <m:r>
+                          <a:rPr lang="en-US" altLang="zh-TW" i="1" dirty="0">
+                            <a:latin typeface="Cambria Math" panose="02040503050406030204" pitchFamily="18" charset="0"/>
+                          </a:rPr>
+                          <m:t>20</m:t>
+                        </m:r>
+                      </m:den>
+                    </m:f>
+                    <m:r>
+                      <a:rPr lang="en-US" altLang="zh-TW" dirty="0">
+                        <a:latin typeface="Cambria Math" panose="02040503050406030204" pitchFamily="18" charset="0"/>
+                      </a:rPr>
+                      <m:t>=25</m:t>
+                    </m:r>
+                    <m:r>
+                      <a:rPr lang="en-US" altLang="zh-TW" b="0" i="0" dirty="0" smtClean="0">
+                        <a:latin typeface="Cambria Math" panose="02040503050406030204" pitchFamily="18" charset="0"/>
+                      </a:rPr>
+                      <m:t>5</m:t>
+                    </m:r>
+                  </m:oMath>
+                </a14:m>
+                <a:r>
+                  <a:rPr lang="en-US" altLang="zh-TW" dirty="0"/>
+                  <a:t> </a:t>
+                </a:r>
+              </a:p>
+              <a:p>
+                <a:r>
+                  <a:rPr lang="en-US" altLang="zh-TW" dirty="0" err="1"/>
+                  <a:t>Approx</a:t>
+                </a:r>
+                <a:r>
+                  <a:rPr lang="en-US" altLang="zh-TW" dirty="0"/>
+                  <a:t> </a:t>
+                </a:r>
+                <a:r>
+                  <a:rPr lang="en-US" altLang="zh-TW" dirty="0" err="1"/>
+                  <a:t>softemax</a:t>
+                </a:r>
+                <a:r>
+                  <a:rPr lang="en-US" altLang="zh-TW" dirty="0"/>
+                  <a:t> output: </a:t>
+                </a:r>
+                <a14:m>
+                  <m:oMath xmlns:m="http://schemas.openxmlformats.org/officeDocument/2006/math">
+                    <m:f>
+                      <m:fPr>
+                        <m:ctrlPr>
+                          <a:rPr lang="en-US" altLang="zh-TW" b="0" i="1" smtClean="0">
+                            <a:latin typeface="Cambria Math" panose="02040503050406030204" pitchFamily="18" charset="0"/>
+                          </a:rPr>
+                        </m:ctrlPr>
+                      </m:fPr>
+                      <m:num>
+                        <m:sSup>
+                          <m:sSupPr>
+                            <m:ctrlPr>
+                              <a:rPr lang="en-US" altLang="zh-TW" b="0" i="1" smtClean="0">
+                                <a:latin typeface="Cambria Math" panose="02040503050406030204" pitchFamily="18" charset="0"/>
+                              </a:rPr>
+                            </m:ctrlPr>
+                          </m:sSupPr>
+                          <m:e>
+                            <m:r>
+                              <a:rPr lang="en-US" altLang="zh-TW" b="0" i="1" smtClean="0">
+                                <a:latin typeface="Cambria Math" panose="02040503050406030204" pitchFamily="18" charset="0"/>
+                              </a:rPr>
+                              <m:t>2</m:t>
+                            </m:r>
+                          </m:e>
+                          <m:sup>
+                            <m:r>
+                              <a:rPr lang="en-US" altLang="zh-TW" b="0" i="1" smtClean="0">
+                                <a:latin typeface="Cambria Math" panose="02040503050406030204" pitchFamily="18" charset="0"/>
+                              </a:rPr>
+                              <m:t>𝑚𝑎𝑥</m:t>
+                            </m:r>
+                          </m:sup>
+                        </m:sSup>
+                      </m:num>
+                      <m:den>
+                        <m:nary>
+                          <m:naryPr>
+                            <m:chr m:val="∑"/>
+                            <m:limLoc m:val="subSup"/>
+                            <m:subHide m:val="on"/>
+                            <m:supHide m:val="on"/>
+                            <m:ctrlPr>
+                              <a:rPr lang="en-US" altLang="zh-TW" b="0" i="1" smtClean="0">
+                                <a:latin typeface="Cambria Math" panose="02040503050406030204" pitchFamily="18" charset="0"/>
+                              </a:rPr>
+                            </m:ctrlPr>
+                          </m:naryPr>
+                          <m:sub/>
+                          <m:sup/>
+                          <m:e>
+                            <m:sSup>
+                              <m:sSupPr>
+                                <m:ctrlPr>
+                                  <a:rPr lang="en-US" altLang="zh-TW" b="0" i="1" smtClean="0">
+                                    <a:latin typeface="Cambria Math" panose="02040503050406030204" pitchFamily="18" charset="0"/>
+                                  </a:rPr>
+                                </m:ctrlPr>
+                              </m:sSupPr>
+                              <m:e>
+                                <m:r>
+                                  <a:rPr lang="en-US" altLang="zh-TW" b="0" i="1" smtClean="0">
+                                    <a:latin typeface="Cambria Math" panose="02040503050406030204" pitchFamily="18" charset="0"/>
+                                  </a:rPr>
+                                  <m:t>2</m:t>
+                                </m:r>
+                              </m:e>
+                              <m:sup>
+                                <m:r>
+                                  <a:rPr lang="en-US" altLang="zh-TW" b="0" i="1" smtClean="0">
+                                    <a:latin typeface="Cambria Math" panose="02040503050406030204" pitchFamily="18" charset="0"/>
+                                  </a:rPr>
+                                  <m:t>𝑚𝑎𝑥</m:t>
+                                </m:r>
+                              </m:sup>
+                            </m:sSup>
+                          </m:e>
+                        </m:nary>
+                      </m:den>
+                    </m:f>
+                    <m:r>
+                      <a:rPr lang="en-US" altLang="zh-TW" b="0" i="1" smtClean="0">
+                        <a:latin typeface="Cambria Math" panose="02040503050406030204" pitchFamily="18" charset="0"/>
+                      </a:rPr>
+                      <m:t>×255=</m:t>
+                    </m:r>
+                    <m:f>
+                      <m:fPr>
+                        <m:ctrlPr>
+                          <a:rPr lang="en-US" altLang="zh-TW" b="0" i="1" smtClean="0">
+                            <a:latin typeface="Cambria Math" panose="02040503050406030204" pitchFamily="18" charset="0"/>
+                          </a:rPr>
+                        </m:ctrlPr>
+                      </m:fPr>
+                      <m:num>
+                        <m:r>
+                          <a:rPr lang="en-US" altLang="zh-TW" b="0" i="1" smtClean="0">
+                            <a:latin typeface="Cambria Math" panose="02040503050406030204" pitchFamily="18" charset="0"/>
+                          </a:rPr>
+                          <m:t>255</m:t>
+                        </m:r>
+                      </m:num>
+                      <m:den>
+                        <m:r>
+                          <a:rPr lang="en-US" altLang="zh-TW" b="0" i="1" smtClean="0">
+                            <a:latin typeface="Cambria Math" panose="02040503050406030204" pitchFamily="18" charset="0"/>
+                          </a:rPr>
+                          <m:t>16</m:t>
+                        </m:r>
+                      </m:den>
+                    </m:f>
+                    <m:r>
+                      <a:rPr lang="en-US" altLang="zh-TW" b="0" i="1" smtClean="0">
+                        <a:latin typeface="Cambria Math" panose="02040503050406030204" pitchFamily="18" charset="0"/>
+                      </a:rPr>
+                      <m:t>=15</m:t>
+                    </m:r>
+                  </m:oMath>
+                </a14:m>
+                <a:r>
+                  <a:rPr lang="en-US" altLang="zh-TW" dirty="0"/>
+                  <a:t> </a:t>
+                </a:r>
+              </a:p>
+              <a:p>
+                <a:endParaRPr lang="zh-TW" altLang="en-US" dirty="0"/>
+              </a:p>
+            </p:txBody>
+          </p:sp>
+        </mc:Choice>
+        <mc:Fallback>
+          <p:sp>
+            <p:nvSpPr>
+              <p:cNvPr id="3" name="內容版面配置區 2">
+                <a:extLst>
+                  <a:ext uri="{FF2B5EF4-FFF2-40B4-BE49-F238E27FC236}">
+                    <a16:creationId xmlns:a16="http://schemas.microsoft.com/office/drawing/2014/main" id="{7F4C614D-E7FE-419C-8F98-21873BA85352}"/>
+                  </a:ext>
+                </a:extLst>
+              </p:cNvPr>
+              <p:cNvSpPr>
+                <a:spLocks noGrp="1" noRot="1" noChangeAspect="1" noMove="1" noResize="1" noEditPoints="1" noAdjustHandles="1" noChangeArrowheads="1" noChangeShapeType="1" noTextEdit="1"/>
+              </p:cNvSpPr>
+              <p:nvPr>
+                <p:ph idx="1"/>
+              </p:nvPr>
+            </p:nvSpPr>
+            <p:spPr>
+              <a:xfrm>
+                <a:off x="1371599" y="1620141"/>
+                <a:ext cx="10534011" cy="1808859"/>
+              </a:xfrm>
+              <a:blipFill>
+                <a:blip r:embed="rId2"/>
+                <a:stretch>
+                  <a:fillRect l="-637"/>
+                </a:stretch>
+              </a:blipFill>
+            </p:spPr>
+            <p:txBody>
+              <a:bodyPr/>
+              <a:lstStyle/>
+              <a:p>
+                <a:r>
+                  <a:rPr lang="zh-TW" altLang="en-US">
+                    <a:noFill/>
+                  </a:rPr>
+                  <a:t> </a:t>
+                </a:r>
+              </a:p>
+            </p:txBody>
+          </p:sp>
+        </mc:Fallback>
+      </mc:AlternateContent>
+      <p:sp>
+        <p:nvSpPr>
+          <p:cNvPr id="4" name="日期版面配置區 3">
+            <a:extLst>
+              <a:ext uri="{FF2B5EF4-FFF2-40B4-BE49-F238E27FC236}">
+                <a16:creationId xmlns:a16="http://schemas.microsoft.com/office/drawing/2014/main" id="{159AF3C7-1F38-4208-B828-B2261917AF9D}"/>
+              </a:ext>
+            </a:extLst>
+          </p:cNvPr>
+          <p:cNvSpPr>
+            <a:spLocks noGrp="1"/>
+          </p:cNvSpPr>
+          <p:nvPr>
+            <p:ph type="dt" sz="half" idx="10"/>
+          </p:nvPr>
+        </p:nvSpPr>
+        <p:spPr/>
+        <p:txBody>
+          <a:bodyPr/>
+          <a:lstStyle/>
+          <a:p>
+            <a:fld id="{D12744AA-2124-42E6-AA52-9077A6A76493}" type="datetime1">
+              <a:rPr lang="zh-TW" altLang="en-US" smtClean="0"/>
+              <a:t>2025/5/19</a:t>
+            </a:fld>
+            <a:endParaRPr lang="zh-TW" altLang="en-US"/>
+          </a:p>
+        </p:txBody>
+      </p:sp>
+      <p:sp>
+        <p:nvSpPr>
+          <p:cNvPr id="5" name="投影片編號版面配置區 4">
+            <a:extLst>
+              <a:ext uri="{FF2B5EF4-FFF2-40B4-BE49-F238E27FC236}">
+                <a16:creationId xmlns:a16="http://schemas.microsoft.com/office/drawing/2014/main" id="{650122B4-4ECD-4625-BAFC-6FB6E0AAF4D9}"/>
+              </a:ext>
+            </a:extLst>
+          </p:cNvPr>
+          <p:cNvSpPr>
+            <a:spLocks noGrp="1"/>
+          </p:cNvSpPr>
+          <p:nvPr>
+            <p:ph type="sldNum" sz="quarter" idx="12"/>
+          </p:nvPr>
+        </p:nvSpPr>
+        <p:spPr/>
+        <p:txBody>
+          <a:bodyPr/>
+          <a:lstStyle/>
+          <a:p>
+            <a:fld id="{13D67497-B2F6-4681-B86D-28F94DA14DA8}" type="slidenum">
+              <a:rPr lang="zh-TW" altLang="en-US" smtClean="0"/>
+              <a:t>14</a:t>
+            </a:fld>
+            <a:endParaRPr lang="zh-TW" altLang="en-US"/>
           </a:p>
         </p:txBody>
       </p:sp>
@@ -5751,7 +7420,7 @@
           <p:nvPr/>
         </p:nvPicPr>
         <p:blipFill rotWithShape="1">
-          <a:blip r:embed="rId2"/>
+          <a:blip r:embed="rId3"/>
           <a:srcRect b="50000"/>
           <a:stretch/>
         </p:blipFill>
@@ -5780,13 +7449,13 @@
           <p:nvPr/>
         </p:nvPicPr>
         <p:blipFill rotWithShape="1">
-          <a:blip r:embed="rId2"/>
+          <a:blip r:embed="rId3"/>
           <a:srcRect t="50000"/>
           <a:stretch/>
         </p:blipFill>
         <p:spPr>
           <a:xfrm>
-            <a:off x="5553183" y="3415159"/>
+            <a:off x="6412351" y="3415158"/>
             <a:ext cx="3478198" cy="2757041"/>
           </a:xfrm>
           <a:prstGeom prst="rect">
@@ -5794,6 +7463,40 @@
           </a:prstGeom>
         </p:spPr>
       </p:pic>
+      <p:sp>
+        <p:nvSpPr>
+          <p:cNvPr id="12" name="標題 1">
+            <a:extLst>
+              <a:ext uri="{FF2B5EF4-FFF2-40B4-BE49-F238E27FC236}">
+                <a16:creationId xmlns:a16="http://schemas.microsoft.com/office/drawing/2014/main" id="{7E7D9EF9-2EC9-4884-9497-535BB35AD115}"/>
+              </a:ext>
+            </a:extLst>
+          </p:cNvPr>
+          <p:cNvSpPr>
+            <a:spLocks noGrp="1"/>
+          </p:cNvSpPr>
+          <p:nvPr>
+            <p:ph type="title"/>
+          </p:nvPr>
+        </p:nvSpPr>
+        <p:spPr>
+          <a:xfrm>
+            <a:off x="1371600" y="685800"/>
+            <a:ext cx="9601200" cy="879113"/>
+          </a:xfrm>
+        </p:spPr>
+        <p:txBody>
+          <a:bodyPr/>
+          <a:lstStyle/>
+          <a:p>
+            <a:r>
+              <a:rPr lang="en-US" altLang="zh-TW" dirty="0"/>
+              <a:t>Comparing Output of PPU</a:t>
+            </a:r>
+            <a:endParaRPr lang="zh-TW" altLang="en-US" dirty="0"/>
+          </a:p>
+        </p:txBody>
+      </p:sp>
     </p:spTree>
     <p:extLst>
       <p:ext uri="{BB962C8B-B14F-4D97-AF65-F5344CB8AC3E}">
@@ -6177,6 +7880,368 @@
               <a:t>3</a:t>
             </a:fld>
             <a:endParaRPr lang="zh-TW" altLang="en-US"/>
+          </a:p>
+        </p:txBody>
+      </p:sp>
+      <p:grpSp>
+        <p:nvGrpSpPr>
+          <p:cNvPr id="11" name="群組 10">
+            <a:extLst>
+              <a:ext uri="{FF2B5EF4-FFF2-40B4-BE49-F238E27FC236}">
+                <a16:creationId xmlns:a16="http://schemas.microsoft.com/office/drawing/2014/main" id="{C92E8CF3-7EE7-48EB-A4AC-AACBE1F6ED00}"/>
+              </a:ext>
+            </a:extLst>
+          </p:cNvPr>
+          <p:cNvGrpSpPr/>
+          <p:nvPr/>
+        </p:nvGrpSpPr>
+        <p:grpSpPr>
+          <a:xfrm>
+            <a:off x="1224314" y="3866469"/>
+            <a:ext cx="10021579" cy="1807447"/>
+            <a:chOff x="1371600" y="3087081"/>
+            <a:chExt cx="10021579" cy="1807447"/>
+          </a:xfrm>
+        </p:grpSpPr>
+        <p:pic>
+          <p:nvPicPr>
+            <p:cNvPr id="7" name="圖片 6">
+              <a:extLst>
+                <a:ext uri="{FF2B5EF4-FFF2-40B4-BE49-F238E27FC236}">
+                  <a16:creationId xmlns:a16="http://schemas.microsoft.com/office/drawing/2014/main" id="{405CCB3C-9E55-49F5-B6FB-BE85642316A9}"/>
+                </a:ext>
+              </a:extLst>
+            </p:cNvPr>
+            <p:cNvPicPr>
+              <a:picLocks noChangeAspect="1"/>
+            </p:cNvPicPr>
+            <p:nvPr/>
+          </p:nvPicPr>
+          <p:blipFill>
+            <a:blip r:embed="rId2"/>
+            <a:stretch>
+              <a:fillRect/>
+            </a:stretch>
+          </p:blipFill>
+          <p:spPr>
+            <a:xfrm>
+              <a:off x="1371600" y="3454135"/>
+              <a:ext cx="10021579" cy="1440393"/>
+            </a:xfrm>
+            <a:prstGeom prst="rect">
+              <a:avLst/>
+            </a:prstGeom>
+          </p:spPr>
+        </p:pic>
+        <p:sp>
+          <p:nvSpPr>
+            <p:cNvPr id="9" name="箭號: 向右 8">
+              <a:extLst>
+                <a:ext uri="{FF2B5EF4-FFF2-40B4-BE49-F238E27FC236}">
+                  <a16:creationId xmlns:a16="http://schemas.microsoft.com/office/drawing/2014/main" id="{EECF6873-F42B-4066-B1BC-8D21A3E9C021}"/>
+                </a:ext>
+              </a:extLst>
+            </p:cNvPr>
+            <p:cNvSpPr/>
+            <p:nvPr/>
+          </p:nvSpPr>
+          <p:spPr>
+            <a:xfrm rot="14441877">
+              <a:off x="4206122" y="3193124"/>
+              <a:ext cx="559920" cy="347833"/>
+            </a:xfrm>
+            <a:prstGeom prst="rightArrow">
+              <a:avLst/>
+            </a:prstGeom>
+            <a:solidFill>
+              <a:srgbClr val="FF0000"/>
+            </a:solidFill>
+            <a:ln>
+              <a:noFill/>
+            </a:ln>
+          </p:spPr>
+          <p:style>
+            <a:lnRef idx="2">
+              <a:schemeClr val="accent1">
+                <a:shade val="50000"/>
+              </a:schemeClr>
+            </a:lnRef>
+            <a:fillRef idx="1">
+              <a:schemeClr val="accent1"/>
+            </a:fillRef>
+            <a:effectRef idx="0">
+              <a:schemeClr val="accent1"/>
+            </a:effectRef>
+            <a:fontRef idx="minor">
+              <a:schemeClr val="lt1"/>
+            </a:fontRef>
+          </p:style>
+          <p:txBody>
+            <a:bodyPr rtlCol="0" anchor="ctr"/>
+            <a:lstStyle/>
+            <a:p>
+              <a:pPr algn="ctr"/>
+              <a:endParaRPr lang="zh-TW" altLang="en-US" dirty="0"/>
+            </a:p>
+          </p:txBody>
+        </p:sp>
+        <p:sp>
+          <p:nvSpPr>
+            <p:cNvPr id="10" name="箭號: 向右 9">
+              <a:extLst>
+                <a:ext uri="{FF2B5EF4-FFF2-40B4-BE49-F238E27FC236}">
+                  <a16:creationId xmlns:a16="http://schemas.microsoft.com/office/drawing/2014/main" id="{FD3B2AFA-A9AC-4BBD-B834-51F077997C58}"/>
+                </a:ext>
+              </a:extLst>
+            </p:cNvPr>
+            <p:cNvSpPr/>
+            <p:nvPr/>
+          </p:nvSpPr>
+          <p:spPr>
+            <a:xfrm rot="16200000">
+              <a:off x="5580465" y="3205400"/>
+              <a:ext cx="559920" cy="347833"/>
+            </a:xfrm>
+            <a:prstGeom prst="rightArrow">
+              <a:avLst/>
+            </a:prstGeom>
+            <a:solidFill>
+              <a:srgbClr val="FF0000"/>
+            </a:solidFill>
+            <a:ln>
+              <a:noFill/>
+            </a:ln>
+          </p:spPr>
+          <p:style>
+            <a:lnRef idx="2">
+              <a:schemeClr val="accent1">
+                <a:shade val="50000"/>
+              </a:schemeClr>
+            </a:lnRef>
+            <a:fillRef idx="1">
+              <a:schemeClr val="accent1"/>
+            </a:fillRef>
+            <a:effectRef idx="0">
+              <a:schemeClr val="accent1"/>
+            </a:effectRef>
+            <a:fontRef idx="minor">
+              <a:schemeClr val="lt1"/>
+            </a:fontRef>
+          </p:style>
+          <p:txBody>
+            <a:bodyPr rtlCol="0" anchor="ctr"/>
+            <a:lstStyle/>
+            <a:p>
+              <a:pPr algn="ctr"/>
+              <a:endParaRPr lang="zh-TW" altLang="en-US"/>
+            </a:p>
+          </p:txBody>
+        </p:sp>
+      </p:grpSp>
+      <p:sp>
+        <p:nvSpPr>
+          <p:cNvPr id="12" name="文字方塊 11">
+            <a:extLst>
+              <a:ext uri="{FF2B5EF4-FFF2-40B4-BE49-F238E27FC236}">
+                <a16:creationId xmlns:a16="http://schemas.microsoft.com/office/drawing/2014/main" id="{C6399046-7ADC-49BC-B783-209A117CC076}"/>
+              </a:ext>
+            </a:extLst>
+          </p:cNvPr>
+          <p:cNvSpPr txBox="1"/>
+          <p:nvPr/>
+        </p:nvSpPr>
+        <p:spPr>
+          <a:xfrm>
+            <a:off x="2984003" y="3075057"/>
+            <a:ext cx="1460585" cy="707886"/>
+          </a:xfrm>
+          <a:prstGeom prst="rect">
+            <a:avLst/>
+          </a:prstGeom>
+          <a:noFill/>
+          <a:ln>
+            <a:solidFill>
+              <a:schemeClr val="tx1"/>
+            </a:solidFill>
+          </a:ln>
+        </p:spPr>
+        <p:txBody>
+          <a:bodyPr wrap="square" rtlCol="0">
+            <a:spAutoFit/>
+          </a:bodyPr>
+          <a:lstStyle/>
+          <a:p>
+            <a:r>
+              <a:rPr lang="en-US" altLang="zh-TW" sz="2000" dirty="0">
+                <a:latin typeface="Times New Roman" panose="02020603050405020304" pitchFamily="18" charset="0"/>
+                <a:ea typeface="標楷體" panose="03000509000000000000" pitchFamily="65" charset="-120"/>
+                <a:cs typeface="Times New Roman" panose="02020603050405020304" pitchFamily="18" charset="0"/>
+              </a:rPr>
+              <a:t>Latch array output </a:t>
+            </a:r>
+            <a:r>
+              <a:rPr lang="en-US" altLang="zh-TW" sz="2000" dirty="0" err="1">
+                <a:latin typeface="Times New Roman" panose="02020603050405020304" pitchFamily="18" charset="0"/>
+                <a:ea typeface="標楷體" panose="03000509000000000000" pitchFamily="65" charset="-120"/>
+                <a:cs typeface="Times New Roman" panose="02020603050405020304" pitchFamily="18" charset="0"/>
+              </a:rPr>
+              <a:t>datas</a:t>
+            </a:r>
+            <a:endParaRPr lang="zh-TW" altLang="en-US" sz="2000" dirty="0">
+              <a:latin typeface="Times New Roman" panose="02020603050405020304" pitchFamily="18" charset="0"/>
+              <a:ea typeface="標楷體" panose="03000509000000000000" pitchFamily="65" charset="-120"/>
+              <a:cs typeface="Times New Roman" panose="02020603050405020304" pitchFamily="18" charset="0"/>
+            </a:endParaRPr>
+          </a:p>
+        </p:txBody>
+      </p:sp>
+      <p:sp>
+        <p:nvSpPr>
+          <p:cNvPr id="13" name="文字方塊 12">
+            <a:extLst>
+              <a:ext uri="{FF2B5EF4-FFF2-40B4-BE49-F238E27FC236}">
+                <a16:creationId xmlns:a16="http://schemas.microsoft.com/office/drawing/2014/main" id="{894911E5-9854-4A0F-8D91-F40ACECCC59B}"/>
+              </a:ext>
+            </a:extLst>
+          </p:cNvPr>
+          <p:cNvSpPr txBox="1"/>
+          <p:nvPr/>
+        </p:nvSpPr>
+        <p:spPr>
+          <a:xfrm>
+            <a:off x="5042169" y="3354147"/>
+            <a:ext cx="1341939" cy="400110"/>
+          </a:xfrm>
+          <a:prstGeom prst="rect">
+            <a:avLst/>
+          </a:prstGeom>
+          <a:noFill/>
+          <a:ln>
+            <a:solidFill>
+              <a:schemeClr val="tx1"/>
+            </a:solidFill>
+          </a:ln>
+        </p:spPr>
+        <p:txBody>
+          <a:bodyPr wrap="square" rtlCol="0">
+            <a:spAutoFit/>
+          </a:bodyPr>
+          <a:lstStyle/>
+          <a:p>
+            <a:r>
+              <a:rPr lang="en-US" altLang="zh-TW" sz="2000" dirty="0">
+                <a:latin typeface="Times New Roman" panose="02020603050405020304" pitchFamily="18" charset="0"/>
+                <a:ea typeface="標楷體" panose="03000509000000000000" pitchFamily="65" charset="-120"/>
+                <a:cs typeface="Times New Roman" panose="02020603050405020304" pitchFamily="18" charset="0"/>
+              </a:rPr>
+              <a:t>Processing</a:t>
+            </a:r>
+            <a:endParaRPr lang="zh-TW" altLang="en-US" sz="2000" dirty="0">
+              <a:latin typeface="Times New Roman" panose="02020603050405020304" pitchFamily="18" charset="0"/>
+              <a:ea typeface="標楷體" panose="03000509000000000000" pitchFamily="65" charset="-120"/>
+              <a:cs typeface="Times New Roman" panose="02020603050405020304" pitchFamily="18" charset="0"/>
+            </a:endParaRPr>
+          </a:p>
+        </p:txBody>
+      </p:sp>
+      <p:sp>
+        <p:nvSpPr>
+          <p:cNvPr id="14" name="箭號: 向右 13">
+            <a:extLst>
+              <a:ext uri="{FF2B5EF4-FFF2-40B4-BE49-F238E27FC236}">
+                <a16:creationId xmlns:a16="http://schemas.microsoft.com/office/drawing/2014/main" id="{D6D6EC50-8969-4A1B-A041-26303A18875C}"/>
+              </a:ext>
+            </a:extLst>
+          </p:cNvPr>
+          <p:cNvSpPr/>
+          <p:nvPr/>
+        </p:nvSpPr>
+        <p:spPr>
+          <a:xfrm rot="17866525">
+            <a:off x="6888976" y="4005463"/>
+            <a:ext cx="559920" cy="347833"/>
+          </a:xfrm>
+          <a:prstGeom prst="rightArrow">
+            <a:avLst/>
+          </a:prstGeom>
+          <a:solidFill>
+            <a:srgbClr val="FF0000"/>
+          </a:solidFill>
+          <a:ln>
+            <a:noFill/>
+          </a:ln>
+        </p:spPr>
+        <p:style>
+          <a:lnRef idx="2">
+            <a:schemeClr val="accent1">
+              <a:shade val="50000"/>
+            </a:schemeClr>
+          </a:lnRef>
+          <a:fillRef idx="1">
+            <a:schemeClr val="accent1"/>
+          </a:fillRef>
+          <a:effectRef idx="0">
+            <a:schemeClr val="accent1"/>
+          </a:effectRef>
+          <a:fontRef idx="minor">
+            <a:schemeClr val="lt1"/>
+          </a:fontRef>
+        </p:style>
+        <p:txBody>
+          <a:bodyPr rtlCol="0" anchor="ctr"/>
+          <a:lstStyle/>
+          <a:p>
+            <a:pPr algn="ctr"/>
+            <a:endParaRPr lang="zh-TW" altLang="en-US"/>
+          </a:p>
+        </p:txBody>
+      </p:sp>
+      <p:sp>
+        <p:nvSpPr>
+          <p:cNvPr id="15" name="文字方塊 14">
+            <a:extLst>
+              <a:ext uri="{FF2B5EF4-FFF2-40B4-BE49-F238E27FC236}">
+                <a16:creationId xmlns:a16="http://schemas.microsoft.com/office/drawing/2014/main" id="{01AEC0F5-BC65-4354-8098-791EC62B8E92}"/>
+              </a:ext>
+            </a:extLst>
+          </p:cNvPr>
+          <p:cNvSpPr txBox="1"/>
+          <p:nvPr/>
+        </p:nvSpPr>
+        <p:spPr>
+          <a:xfrm>
+            <a:off x="7218307" y="3347580"/>
+            <a:ext cx="1058213" cy="400110"/>
+          </a:xfrm>
+          <a:prstGeom prst="rect">
+            <a:avLst/>
+          </a:prstGeom>
+          <a:noFill/>
+          <a:ln>
+            <a:solidFill>
+              <a:schemeClr val="tx1"/>
+            </a:solidFill>
+          </a:ln>
+        </p:spPr>
+        <p:txBody>
+          <a:bodyPr wrap="square" rtlCol="0">
+            <a:spAutoFit/>
+          </a:bodyPr>
+          <a:lstStyle/>
+          <a:p>
+            <a:r>
+              <a:rPr lang="en-US" altLang="zh-TW" sz="2000" dirty="0">
+                <a:latin typeface="Times New Roman" panose="02020603050405020304" pitchFamily="18" charset="0"/>
+                <a:ea typeface="標楷體" panose="03000509000000000000" pitchFamily="65" charset="-120"/>
+                <a:cs typeface="Times New Roman" panose="02020603050405020304" pitchFamily="18" charset="0"/>
+              </a:rPr>
+              <a:t>Output</a:t>
+            </a:r>
+            <a:endParaRPr lang="zh-TW" altLang="en-US" sz="2000" dirty="0">
+              <a:latin typeface="Times New Roman" panose="02020603050405020304" pitchFamily="18" charset="0"/>
+              <a:ea typeface="標楷體" panose="03000509000000000000" pitchFamily="65" charset="-120"/>
+              <a:cs typeface="Times New Roman" panose="02020603050405020304" pitchFamily="18" charset="0"/>
+            </a:endParaRPr>
           </a:p>
         </p:txBody>
       </p:sp>
@@ -7270,73 +9335,190 @@
           </a:p>
         </p:txBody>
       </p:sp>
-      <p:sp>
-        <p:nvSpPr>
-          <p:cNvPr id="3" name="內容版面配置區 2">
-            <a:extLst>
-              <a:ext uri="{FF2B5EF4-FFF2-40B4-BE49-F238E27FC236}">
-                <a16:creationId xmlns:a16="http://schemas.microsoft.com/office/drawing/2014/main" id="{8A78F75B-FA97-4A70-B1CA-D701F2BA954D}"/>
-              </a:ext>
-            </a:extLst>
-          </p:cNvPr>
-          <p:cNvSpPr>
-            <a:spLocks noGrp="1"/>
-          </p:cNvSpPr>
-          <p:nvPr>
-            <p:ph idx="1"/>
-          </p:nvPr>
-        </p:nvSpPr>
-        <p:spPr>
-          <a:xfrm>
-            <a:off x="838200" y="1825625"/>
-            <a:ext cx="5713464" cy="4507670"/>
-          </a:xfrm>
-        </p:spPr>
-        <p:txBody>
-          <a:bodyPr>
-            <a:normAutofit/>
-          </a:bodyPr>
-          <a:lstStyle/>
-          <a:p>
-            <a:r>
-              <a:rPr lang="en-US" altLang="zh-TW" dirty="0"/>
-              <a:t>Testcase: Mimicking</a:t>
-            </a:r>
-            <a:r>
-              <a:rPr lang="zh-TW" altLang="en-US" dirty="0"/>
-              <a:t> </a:t>
-            </a:r>
-            <a:r>
-              <a:rPr lang="en-US" altLang="zh-TW" dirty="0"/>
-              <a:t>mac unit multiplying (70, 80) and (40, 90)</a:t>
-            </a:r>
-          </a:p>
-          <a:p>
-            <a:r>
-              <a:rPr lang="en-US" altLang="zh-TW" dirty="0"/>
-              <a:t>Quantized int4 data: (6, 7),  (3, 7)</a:t>
-            </a:r>
-          </a:p>
-          <a:p>
-            <a:r>
-              <a:rPr lang="en-US" altLang="zh-TW" dirty="0"/>
-              <a:t>CS: 0.101237 = 0x1D in FP8</a:t>
-            </a:r>
-          </a:p>
-          <a:p>
-            <a:r>
-              <a:rPr lang="en-US" altLang="zh-TW" dirty="0"/>
-              <a:t>VSs: 113, 127.  </a:t>
-            </a:r>
-          </a:p>
-          <a:p>
-            <a:r>
-              <a:rPr lang="en-US" altLang="zh-TW" dirty="0"/>
-              <a:t>Output of mac should be (6 * 3 + 7 * 7) * 113 * 127 = 961517</a:t>
-            </a:r>
-          </a:p>
-        </p:txBody>
-      </p:sp>
+      <mc:AlternateContent xmlns:mc="http://schemas.openxmlformats.org/markup-compatibility/2006">
+        <mc:Choice xmlns:a14="http://schemas.microsoft.com/office/drawing/2010/main" Requires="a14">
+          <p:sp>
+            <p:nvSpPr>
+              <p:cNvPr id="3" name="內容版面配置區 2">
+                <a:extLst>
+                  <a:ext uri="{FF2B5EF4-FFF2-40B4-BE49-F238E27FC236}">
+                    <a16:creationId xmlns:a16="http://schemas.microsoft.com/office/drawing/2014/main" id="{8A78F75B-FA97-4A70-B1CA-D701F2BA954D}"/>
+                  </a:ext>
+                </a:extLst>
+              </p:cNvPr>
+              <p:cNvSpPr>
+                <a:spLocks noGrp="1"/>
+              </p:cNvSpPr>
+              <p:nvPr>
+                <p:ph idx="1"/>
+              </p:nvPr>
+            </p:nvSpPr>
+            <p:spPr>
+              <a:xfrm>
+                <a:off x="838200" y="1825625"/>
+                <a:ext cx="5713464" cy="4507670"/>
+              </a:xfrm>
+            </p:spPr>
+            <p:txBody>
+              <a:bodyPr>
+                <a:normAutofit/>
+              </a:bodyPr>
+              <a:lstStyle/>
+              <a:p>
+                <a:r>
+                  <a:rPr lang="en-US" altLang="zh-TW" dirty="0"/>
+                  <a:t>Testcase: Mimicking</a:t>
+                </a:r>
+                <a:r>
+                  <a:rPr lang="zh-TW" altLang="en-US" dirty="0"/>
+                  <a:t> </a:t>
+                </a:r>
+                <a:r>
+                  <a:rPr lang="en-US" altLang="zh-TW" dirty="0"/>
+                  <a:t>mac unit multiplying (70, 80) and (40, 90)</a:t>
+                </a:r>
+              </a:p>
+              <a:p>
+                <a:r>
+                  <a:rPr lang="en-US" altLang="zh-TW" dirty="0"/>
+                  <a:t>Quantized int4 data: (6, 7),  (3, 7)</a:t>
+                </a:r>
+              </a:p>
+              <a:p>
+                <a:r>
+                  <a:rPr lang="en-US" altLang="zh-TW" dirty="0"/>
+                  <a:t>CS: 0.101237 = 0x1D in FP8</a:t>
+                </a:r>
+              </a:p>
+              <a:p>
+                <a:r>
+                  <a:rPr lang="en-US" altLang="zh-TW" dirty="0"/>
+                  <a:t>VSs: 113, 127.  </a:t>
+                </a:r>
+              </a:p>
+              <a:p>
+                <a:r>
+                  <a:rPr lang="en-US" altLang="zh-TW" dirty="0"/>
+                  <a:t>Output of mac should be </a:t>
+                </a:r>
+                <a14:m>
+                  <m:oMath xmlns:m="http://schemas.openxmlformats.org/officeDocument/2006/math">
+                    <m:d>
+                      <m:dPr>
+                        <m:ctrlPr>
+                          <a:rPr lang="en-US" altLang="zh-TW" i="1" dirty="0" smtClean="0">
+                            <a:latin typeface="Cambria Math" panose="02040503050406030204" pitchFamily="18" charset="0"/>
+                          </a:rPr>
+                        </m:ctrlPr>
+                      </m:dPr>
+                      <m:e>
+                        <m:r>
+                          <a:rPr lang="en-US" altLang="zh-TW" i="1" dirty="0" smtClean="0">
+                            <a:latin typeface="Cambria Math" panose="02040503050406030204" pitchFamily="18" charset="0"/>
+                          </a:rPr>
+                          <m:t>6</m:t>
+                        </m:r>
+                        <m:r>
+                          <a:rPr lang="en-US" altLang="zh-TW" b="0" i="1" dirty="0" smtClean="0">
+                            <a:latin typeface="Cambria Math" panose="02040503050406030204" pitchFamily="18" charset="0"/>
+                          </a:rPr>
+                          <m:t>×</m:t>
+                        </m:r>
+                        <m:r>
+                          <a:rPr lang="en-US" altLang="zh-TW" i="1" dirty="0" smtClean="0">
+                            <a:latin typeface="Cambria Math" panose="02040503050406030204" pitchFamily="18" charset="0"/>
+                          </a:rPr>
+                          <m:t>3+7</m:t>
+                        </m:r>
+                        <m:r>
+                          <a:rPr lang="en-US" altLang="zh-TW" b="0" i="1" dirty="0" smtClean="0">
+                            <a:latin typeface="Cambria Math" panose="02040503050406030204" pitchFamily="18" charset="0"/>
+                          </a:rPr>
+                          <m:t>×</m:t>
+                        </m:r>
+                        <m:r>
+                          <a:rPr lang="en-US" altLang="zh-TW" i="1" dirty="0" smtClean="0">
+                            <a:latin typeface="Cambria Math" panose="02040503050406030204" pitchFamily="18" charset="0"/>
+                          </a:rPr>
+                          <m:t>7</m:t>
+                        </m:r>
+                      </m:e>
+                    </m:d>
+                    <m:r>
+                      <a:rPr lang="en-US" altLang="zh-TW" b="0" i="1" dirty="0" smtClean="0">
+                        <a:latin typeface="Cambria Math" panose="02040503050406030204" pitchFamily="18" charset="0"/>
+                      </a:rPr>
+                      <m:t>×</m:t>
+                    </m:r>
+                    <m:r>
+                      <a:rPr lang="en-US" altLang="zh-TW" i="1" dirty="0" smtClean="0">
+                        <a:latin typeface="Cambria Math" panose="02040503050406030204" pitchFamily="18" charset="0"/>
+                      </a:rPr>
+                      <m:t>113</m:t>
+                    </m:r>
+                    <m:r>
+                      <a:rPr lang="en-US" altLang="zh-TW" b="0" i="1" dirty="0" smtClean="0">
+                        <a:latin typeface="Cambria Math" panose="02040503050406030204" pitchFamily="18" charset="0"/>
+                      </a:rPr>
+                      <m:t>×</m:t>
+                    </m:r>
+                    <m:r>
+                      <a:rPr lang="en-US" altLang="zh-TW" i="1" dirty="0" smtClean="0">
+                        <a:latin typeface="Cambria Math" panose="02040503050406030204" pitchFamily="18" charset="0"/>
+                      </a:rPr>
+                      <m:t>127 = 961517</m:t>
+                    </m:r>
+                  </m:oMath>
+                </a14:m>
+                <a:endParaRPr lang="en-US" altLang="zh-TW" dirty="0"/>
+              </a:p>
+            </p:txBody>
+          </p:sp>
+        </mc:Choice>
+        <mc:Fallback>
+          <p:sp>
+            <p:nvSpPr>
+              <p:cNvPr id="3" name="內容版面配置區 2">
+                <a:extLst>
+                  <a:ext uri="{FF2B5EF4-FFF2-40B4-BE49-F238E27FC236}">
+                    <a16:creationId xmlns:a16="http://schemas.microsoft.com/office/drawing/2014/main" id="{8A78F75B-FA97-4A70-B1CA-D701F2BA954D}"/>
+                  </a:ext>
+                </a:extLst>
+              </p:cNvPr>
+              <p:cNvSpPr>
+                <a:spLocks noGrp="1" noRot="1" noChangeAspect="1" noMove="1" noResize="1" noEditPoints="1" noAdjustHandles="1" noChangeArrowheads="1" noChangeShapeType="1" noTextEdit="1"/>
+              </p:cNvSpPr>
+              <p:nvPr>
+                <p:ph idx="1"/>
+              </p:nvPr>
+            </p:nvSpPr>
+            <p:spPr>
+              <a:xfrm>
+                <a:off x="838200" y="1825625"/>
+                <a:ext cx="5713464" cy="4507670"/>
+              </a:xfrm>
+              <a:blipFill>
+                <a:blip r:embed="rId2"/>
+                <a:stretch>
+                  <a:fillRect l="-1494" b="-19595"/>
+                </a:stretch>
+              </a:blipFill>
+            </p:spPr>
+            <p:txBody>
+              <a:bodyPr/>
+              <a:lstStyle/>
+              <a:p>
+                <a:r>
+                  <a:rPr lang="zh-TW" altLang="en-US">
+                    <a:noFill/>
+                  </a:rPr>
+                  <a:t> </a:t>
+                </a:r>
+              </a:p>
+            </p:txBody>
+          </p:sp>
+        </mc:Fallback>
+      </mc:AlternateContent>
       <p:sp>
         <p:nvSpPr>
           <p:cNvPr id="4" name="日期版面配置區 3">
@@ -7410,7 +9592,7 @@
           <p:nvPr/>
         </p:nvPicPr>
         <p:blipFill>
-          <a:blip r:embed="rId2"/>
+          <a:blip r:embed="rId3"/>
           <a:stretch>
             <a:fillRect/>
           </a:stretch>
@@ -7595,7 +9777,7 @@
           <p:nvPr/>
         </p:nvPicPr>
         <p:blipFill>
-          <a:blip r:embed="rId3"/>
+          <a:blip r:embed="rId4"/>
           <a:stretch>
             <a:fillRect/>
           </a:stretch>
@@ -7625,7 +9807,7 @@
           <p:nvPr/>
         </p:nvPicPr>
         <p:blipFill>
-          <a:blip r:embed="rId4"/>
+          <a:blip r:embed="rId5"/>
           <a:stretch>
             <a:fillRect/>
           </a:stretch>
@@ -9253,7 +11435,7 @@
         </p:blipFill>
         <p:spPr>
           <a:xfrm>
-            <a:off x="5475909" y="2129509"/>
+            <a:off x="5439087" y="2215427"/>
             <a:ext cx="6660858" cy="3238428"/>
           </a:xfrm>
           <a:prstGeom prst="rect">

</xml_diff>

<commit_message>
fix mac and acc, also fix buffer_gen.py and txt files
</commit_message>
<xml_diff>
--- a/ppt/0520.pptx
+++ b/ppt/0520.pptx
@@ -210,7 +210,7 @@
           <a:p>
             <a:fld id="{FEE5F619-DF5E-416B-B866-5F6697AABCEE}" type="datetimeFigureOut">
               <a:rPr lang="zh-TW" altLang="en-US" smtClean="0"/>
-              <a:t>2025/5/19</a:t>
+              <a:t>2025/5/20</a:t>
             </a:fld>
             <a:endParaRPr lang="zh-TW" altLang="en-US"/>
           </a:p>
@@ -646,7 +646,7 @@
           <a:p>
             <a:fld id="{B5CC9422-2511-4DEB-8886-B5AD4CD25B7D}" type="datetime1">
               <a:rPr lang="zh-TW" altLang="en-US" smtClean="0"/>
-              <a:t>2025/5/19</a:t>
+              <a:t>2025/5/20</a:t>
             </a:fld>
             <a:endParaRPr lang="zh-TW" altLang="en-US"/>
           </a:p>
@@ -976,7 +976,7 @@
           <a:p>
             <a:fld id="{B6DDFE32-2043-4B95-8CEA-949D1D532E89}" type="datetime1">
               <a:rPr lang="zh-TW" altLang="en-US" smtClean="0"/>
-              <a:t>2025/5/19</a:t>
+              <a:t>2025/5/20</a:t>
             </a:fld>
             <a:endParaRPr lang="zh-TW" altLang="en-US"/>
           </a:p>
@@ -1156,7 +1156,7 @@
           <a:p>
             <a:fld id="{207C0BCD-8E35-4E36-BA70-DF8CCEC4F900}" type="datetime1">
               <a:rPr lang="zh-TW" altLang="en-US" smtClean="0"/>
-              <a:t>2025/5/19</a:t>
+              <a:t>2025/5/20</a:t>
             </a:fld>
             <a:endParaRPr lang="zh-TW" altLang="en-US"/>
           </a:p>
@@ -1365,7 +1365,7 @@
           <a:p>
             <a:fld id="{D12744AA-2124-42E6-AA52-9077A6A76493}" type="datetime1">
               <a:rPr lang="zh-TW" altLang="en-US" smtClean="0"/>
-              <a:t>2025/5/19</a:t>
+              <a:t>2025/5/20</a:t>
             </a:fld>
             <a:endParaRPr lang="zh-TW" altLang="en-US"/>
           </a:p>
@@ -1642,7 +1642,7 @@
           <a:p>
             <a:fld id="{1E2A031D-4FFA-4B7E-B90B-3B0E99D95905}" type="datetime1">
               <a:rPr lang="zh-TW" altLang="en-US" smtClean="0"/>
-              <a:t>2025/5/19</a:t>
+              <a:t>2025/5/20</a:t>
             </a:fld>
             <a:endParaRPr lang="zh-TW" altLang="en-US"/>
           </a:p>
@@ -2036,7 +2036,7 @@
           <a:p>
             <a:fld id="{D963E789-9038-455D-87FB-B3612E9AC9A3}" type="datetime1">
               <a:rPr lang="zh-TW" altLang="en-US" smtClean="0"/>
-              <a:t>2025/5/19</a:t>
+              <a:t>2025/5/20</a:t>
             </a:fld>
             <a:endParaRPr lang="zh-TW" altLang="en-US"/>
           </a:p>
@@ -2513,7 +2513,7 @@
           <a:p>
             <a:fld id="{1AE525C3-42CF-4363-9956-46937FDA7220}" type="datetime1">
               <a:rPr lang="zh-TW" altLang="en-US" smtClean="0"/>
-              <a:t>2025/5/19</a:t>
+              <a:t>2025/5/20</a:t>
             </a:fld>
             <a:endParaRPr lang="zh-TW" altLang="en-US"/>
           </a:p>
@@ -2631,7 +2631,7 @@
           <a:p>
             <a:fld id="{4675F6D4-C983-4750-ACFD-FFD733A8AEBA}" type="datetime1">
               <a:rPr lang="zh-TW" altLang="en-US" smtClean="0"/>
-              <a:t>2025/5/19</a:t>
+              <a:t>2025/5/20</a:t>
             </a:fld>
             <a:endParaRPr lang="zh-TW" altLang="en-US"/>
           </a:p>
@@ -2726,7 +2726,7 @@
           <a:p>
             <a:fld id="{956BF6A0-178A-49B5-817C-3A928D943E2A}" type="datetime1">
               <a:rPr lang="zh-TW" altLang="en-US" smtClean="0"/>
-              <a:t>2025/5/19</a:t>
+              <a:t>2025/5/20</a:t>
             </a:fld>
             <a:endParaRPr lang="zh-TW" altLang="en-US"/>
           </a:p>
@@ -3072,7 +3072,7 @@
           <a:p>
             <a:fld id="{FFA7AC8A-5481-4A69-A182-F9F960B32A4D}" type="datetime1">
               <a:rPr lang="zh-TW" altLang="en-US" smtClean="0"/>
-              <a:t>2025/5/19</a:t>
+              <a:t>2025/5/20</a:t>
             </a:fld>
             <a:endParaRPr lang="zh-TW" altLang="en-US"/>
           </a:p>
@@ -3460,7 +3460,7 @@
           <a:p>
             <a:fld id="{FFD0E206-1C27-4E41-AC82-7A0AA2282A21}" type="datetime1">
               <a:rPr lang="zh-TW" altLang="en-US" smtClean="0"/>
-              <a:t>2025/5/19</a:t>
+              <a:t>2025/5/20</a:t>
             </a:fld>
             <a:endParaRPr lang="zh-TW" altLang="en-US"/>
           </a:p>
@@ -3742,7 +3742,7 @@
             <a:fld id="{B73B85AF-FB41-4DE2-B200-20D62EB52EF6}" type="datetime1">
               <a:rPr lang="zh-TW" altLang="en-US" smtClean="0"/>
               <a:pPr/>
-              <a:t>2025/5/19</a:t>
+              <a:t>2025/5/20</a:t>
             </a:fld>
             <a:endParaRPr lang="zh-TW" altLang="en-US"/>
           </a:p>
@@ -4345,7 +4345,7 @@
                 <a:latin typeface="Times New Roman" panose="02020603050405020304" pitchFamily="18" charset="0"/>
                 <a:cs typeface="Times New Roman" panose="02020603050405020304" pitchFamily="18" charset="0"/>
               </a:rPr>
-              <a:t>2025/5/19</a:t>
+              <a:t>2025/5/20</a:t>
             </a:fld>
             <a:endParaRPr lang="zh-TW" altLang="en-US" sz="1600" dirty="0">
               <a:latin typeface="Times New Roman" panose="02020603050405020304" pitchFamily="18" charset="0"/>
@@ -4772,7 +4772,7 @@
           <a:p>
             <a:fld id="{D12744AA-2124-42E6-AA52-9077A6A76493}" type="datetime1">
               <a:rPr lang="zh-TW" altLang="en-US" smtClean="0"/>
-              <a:t>2025/5/19</a:t>
+              <a:t>2025/5/20</a:t>
             </a:fld>
             <a:endParaRPr lang="zh-TW" altLang="en-US"/>
           </a:p>
@@ -5416,8 +5416,8 @@
           </a:p>
         </p:txBody>
       </p:sp>
-      <mc:AlternateContent xmlns:mc="http://schemas.openxmlformats.org/markup-compatibility/2006">
-        <mc:Choice xmlns:a14="http://schemas.microsoft.com/office/drawing/2010/main" Requires="a14">
+      <mc:AlternateContent xmlns:mc="http://schemas.openxmlformats.org/markup-compatibility/2006" xmlns:a14="http://schemas.microsoft.com/office/drawing/2010/main">
+        <mc:Choice Requires="a14">
           <p:sp>
             <p:nvSpPr>
               <p:cNvPr id="3" name="內容版面配置區 2">
@@ -5788,7 +5788,7 @@
             </p:txBody>
           </p:sp>
         </mc:Choice>
-        <mc:Fallback>
+        <mc:Fallback xmlns="">
           <p:sp>
             <p:nvSpPr>
               <p:cNvPr id="3" name="內容版面配置區 2">
@@ -5855,7 +5855,7 @@
           <a:p>
             <a:fld id="{D12744AA-2124-42E6-AA52-9077A6A76493}" type="datetime1">
               <a:rPr lang="zh-TW" altLang="en-US" smtClean="0"/>
-              <a:t>2025/5/19</a:t>
+              <a:t>2025/5/20</a:t>
             </a:fld>
             <a:endParaRPr lang="zh-TW" altLang="en-US"/>
           </a:p>
@@ -5954,8 +5954,8 @@
           </a:p>
         </p:txBody>
       </p:sp>
-      <mc:AlternateContent xmlns:mc="http://schemas.openxmlformats.org/markup-compatibility/2006">
-        <mc:Choice xmlns:a14="http://schemas.microsoft.com/office/drawing/2010/main" Requires="a14">
+      <mc:AlternateContent xmlns:mc="http://schemas.openxmlformats.org/markup-compatibility/2006" xmlns:a14="http://schemas.microsoft.com/office/drawing/2010/main">
+        <mc:Choice Requires="a14">
           <p:sp>
             <p:nvSpPr>
               <p:cNvPr id="3" name="內容版面配置區 2">
@@ -6090,13 +6090,7 @@
                       <a:rPr lang="en-US" altLang="zh-TW" b="0" i="1" dirty="0" smtClean="0">
                         <a:latin typeface="Cambria Math" panose="02040503050406030204" pitchFamily="18" charset="0"/>
                       </a:rPr>
-                      <m:t>29794</m:t>
-                    </m:r>
-                    <m:r>
-                      <a:rPr lang="en-US" altLang="zh-TW" b="0" i="1" dirty="0" smtClean="0">
-                        <a:latin typeface="Cambria Math" panose="02040503050406030204" pitchFamily="18" charset="0"/>
-                      </a:rPr>
-                      <m:t>×</m:t>
+                      <m:t>29794×</m:t>
                     </m:r>
                     <m:r>
                       <a:rPr lang="en-US" altLang="zh-TW" i="1" dirty="0" smtClean="0">
@@ -6447,7 +6441,7 @@
             </p:txBody>
           </p:sp>
         </mc:Choice>
-        <mc:Fallback>
+        <mc:Fallback xmlns="">
           <p:sp>
             <p:nvSpPr>
               <p:cNvPr id="3" name="內容版面配置區 2">
@@ -6514,7 +6508,7 @@
           <a:p>
             <a:fld id="{D12744AA-2124-42E6-AA52-9077A6A76493}" type="datetime1">
               <a:rPr lang="zh-TW" altLang="en-US" smtClean="0"/>
-              <a:t>2025/5/19</a:t>
+              <a:t>2025/5/20</a:t>
             </a:fld>
             <a:endParaRPr lang="zh-TW" altLang="en-US"/>
           </a:p>
@@ -6579,8 +6573,8 @@
           <a:chExt cx="0" cy="0"/>
         </a:xfrm>
       </p:grpSpPr>
-      <mc:AlternateContent xmlns:mc="http://schemas.openxmlformats.org/markup-compatibility/2006">
-        <mc:Choice xmlns:a14="http://schemas.microsoft.com/office/drawing/2010/main" Requires="a14">
+      <mc:AlternateContent xmlns:mc="http://schemas.openxmlformats.org/markup-compatibility/2006" xmlns:a14="http://schemas.microsoft.com/office/drawing/2010/main">
+        <mc:Choice Requires="a14">
           <p:sp>
             <p:nvSpPr>
               <p:cNvPr id="3" name="內容版面配置區 2">
@@ -6715,13 +6709,7 @@
                       <a:rPr lang="en-US" altLang="zh-TW" b="0" i="1" dirty="0" smtClean="0">
                         <a:latin typeface="Cambria Math" panose="02040503050406030204" pitchFamily="18" charset="0"/>
                       </a:rPr>
-                      <m:t>29794</m:t>
-                    </m:r>
-                    <m:r>
-                      <a:rPr lang="en-US" altLang="zh-TW" b="0" i="1" dirty="0" smtClean="0">
-                        <a:latin typeface="Cambria Math" panose="02040503050406030204" pitchFamily="18" charset="0"/>
-                      </a:rPr>
-                      <m:t>×</m:t>
+                      <m:t>29794×</m:t>
                     </m:r>
                     <m:r>
                       <a:rPr lang="en-US" altLang="zh-TW" i="1" dirty="0" smtClean="0">
@@ -6809,7 +6797,7 @@
             </p:txBody>
           </p:sp>
         </mc:Choice>
-        <mc:Fallback>
+        <mc:Fallback xmlns="">
           <p:sp>
             <p:nvSpPr>
               <p:cNvPr id="3" name="內容版面配置區 2">
@@ -6876,7 +6864,7 @@
           <a:p>
             <a:fld id="{D12744AA-2124-42E6-AA52-9077A6A76493}" type="datetime1">
               <a:rPr lang="zh-TW" altLang="en-US" smtClean="0"/>
-              <a:t>2025/5/19</a:t>
+              <a:t>2025/5/20</a:t>
             </a:fld>
             <a:endParaRPr lang="zh-TW" altLang="en-US"/>
           </a:p>
@@ -7005,8 +6993,8 @@
           <a:chExt cx="0" cy="0"/>
         </a:xfrm>
       </p:grpSpPr>
-      <mc:AlternateContent xmlns:mc="http://schemas.openxmlformats.org/markup-compatibility/2006">
-        <mc:Choice xmlns:a14="http://schemas.microsoft.com/office/drawing/2010/main" Requires="a14">
+      <mc:AlternateContent xmlns:mc="http://schemas.openxmlformats.org/markup-compatibility/2006" xmlns:a14="http://schemas.microsoft.com/office/drawing/2010/main">
+        <mc:Choice Requires="a14">
           <p:sp>
             <p:nvSpPr>
               <p:cNvPr id="3" name="內容版面配置區 2">
@@ -7200,10 +7188,10 @@
                           </m:e>
                           <m:sup>
                             <m:r>
-                              <a:rPr lang="en-US" altLang="zh-TW" b="0" i="1" smtClean="0">
+                              <a:rPr lang="en-US" altLang="zh-TW" i="1">
                                 <a:latin typeface="Cambria Math" panose="02040503050406030204" pitchFamily="18" charset="0"/>
                               </a:rPr>
-                              <m:t>𝑚𝑎𝑥</m:t>
+                              <m:t>7</m:t>
                             </m:r>
                           </m:sup>
                         </m:sSup>
@@ -7242,10 +7230,10 @@
                               </m:e>
                               <m:sup>
                                 <m:r>
-                                  <a:rPr lang="en-US" altLang="zh-TW" b="0" i="1" smtClean="0">
+                                  <a:rPr lang="en-US" altLang="zh-TW" i="1">
                                     <a:latin typeface="Cambria Math" panose="02040503050406030204" pitchFamily="18" charset="0"/>
                                   </a:rPr>
-                                  <m:t>𝑚𝑎𝑥</m:t>
+                                  <m:t>7</m:t>
                                 </m:r>
                               </m:sup>
                             </m:sSup>
@@ -7303,7 +7291,7 @@
             </p:txBody>
           </p:sp>
         </mc:Choice>
-        <mc:Fallback>
+        <mc:Fallback xmlns="">
           <p:sp>
             <p:nvSpPr>
               <p:cNvPr id="3" name="內容版面配置區 2">
@@ -7370,7 +7358,7 @@
           <a:p>
             <a:fld id="{D12744AA-2124-42E6-AA52-9077A6A76493}" type="datetime1">
               <a:rPr lang="zh-TW" altLang="en-US" smtClean="0"/>
-              <a:t>2025/5/19</a:t>
+              <a:t>2025/5/20</a:t>
             </a:fld>
             <a:endParaRPr lang="zh-TW" altLang="en-US"/>
           </a:p>
@@ -7614,7 +7602,7 @@
           <a:p>
             <a:fld id="{D12744AA-2124-42E6-AA52-9077A6A76493}" type="datetime1">
               <a:rPr lang="zh-TW" altLang="en-US" smtClean="0"/>
-              <a:t>2025/5/19</a:t>
+              <a:t>2025/5/20</a:t>
             </a:fld>
             <a:endParaRPr lang="zh-TW" altLang="en-US"/>
           </a:p>
@@ -7848,7 +7836,7 @@
           <a:p>
             <a:fld id="{D12744AA-2124-42E6-AA52-9077A6A76493}" type="datetime1">
               <a:rPr lang="zh-TW" altLang="en-US" smtClean="0"/>
-              <a:t>2025/5/19</a:t>
+              <a:t>2025/5/20</a:t>
             </a:fld>
             <a:endParaRPr lang="zh-TW" altLang="en-US"/>
           </a:p>
@@ -8637,7 +8625,7 @@
           <a:p>
             <a:fld id="{D12744AA-2124-42E6-AA52-9077A6A76493}" type="datetime1">
               <a:rPr lang="zh-TW" altLang="en-US" smtClean="0"/>
-              <a:t>2025/5/19</a:t>
+              <a:t>2025/5/20</a:t>
             </a:fld>
             <a:endParaRPr lang="zh-TW" altLang="en-US"/>
           </a:p>
@@ -9183,7 +9171,7 @@
           <a:p>
             <a:fld id="{D12744AA-2124-42E6-AA52-9077A6A76493}" type="datetime1">
               <a:rPr lang="zh-TW" altLang="en-US" smtClean="0"/>
-              <a:t>2025/5/19</a:t>
+              <a:t>2025/5/20</a:t>
             </a:fld>
             <a:endParaRPr lang="zh-TW" altLang="en-US"/>
           </a:p>
@@ -9335,8 +9323,8 @@
           </a:p>
         </p:txBody>
       </p:sp>
-      <mc:AlternateContent xmlns:mc="http://schemas.openxmlformats.org/markup-compatibility/2006">
-        <mc:Choice xmlns:a14="http://schemas.microsoft.com/office/drawing/2010/main" Requires="a14">
+      <mc:AlternateContent xmlns:mc="http://schemas.openxmlformats.org/markup-compatibility/2006" xmlns:a14="http://schemas.microsoft.com/office/drawing/2010/main">
+        <mc:Choice Requires="a14">
           <p:sp>
             <p:nvSpPr>
               <p:cNvPr id="3" name="內容版面配置區 2">
@@ -9475,7 +9463,7 @@
             </p:txBody>
           </p:sp>
         </mc:Choice>
-        <mc:Fallback>
+        <mc:Fallback xmlns="">
           <p:sp>
             <p:nvSpPr>
               <p:cNvPr id="3" name="內容版面配置區 2">
@@ -9542,7 +9530,7 @@
           <a:p>
             <a:fld id="{D12744AA-2124-42E6-AA52-9077A6A76493}" type="datetime1">
               <a:rPr lang="zh-TW" altLang="en-US" smtClean="0"/>
-              <a:t>2025/5/19</a:t>
+              <a:t>2025/5/20</a:t>
             </a:fld>
             <a:endParaRPr lang="zh-TW" altLang="en-US" dirty="0"/>
           </a:p>
@@ -10862,7 +10850,7 @@
           <a:p>
             <a:fld id="{D12744AA-2124-42E6-AA52-9077A6A76493}" type="datetime1">
               <a:rPr lang="zh-TW" altLang="en-US" smtClean="0"/>
-              <a:t>2025/5/19</a:t>
+              <a:t>2025/5/20</a:t>
             </a:fld>
             <a:endParaRPr lang="zh-TW" altLang="en-US"/>
           </a:p>
@@ -11041,7 +11029,7 @@
           <a:p>
             <a:fld id="{D12744AA-2124-42E6-AA52-9077A6A76493}" type="datetime1">
               <a:rPr lang="zh-TW" altLang="en-US" smtClean="0"/>
-              <a:t>2025/5/19</a:t>
+              <a:t>2025/5/20</a:t>
             </a:fld>
             <a:endParaRPr lang="zh-TW" altLang="en-US"/>
           </a:p>
@@ -11378,7 +11366,7 @@
           <a:p>
             <a:fld id="{D12744AA-2124-42E6-AA52-9077A6A76493}" type="datetime1">
               <a:rPr lang="zh-TW" altLang="en-US" smtClean="0"/>
-              <a:t>2025/5/19</a:t>
+              <a:t>2025/5/20</a:t>
             </a:fld>
             <a:endParaRPr lang="zh-TW" altLang="en-US"/>
           </a:p>

</xml_diff>